<commit_message>
Added some notes and small corrections to slides
</commit_message>
<xml_diff>
--- a/slides/01_fundamentals_course_slides.pptx
+++ b/slides/01_fundamentals_course_slides.pptx
@@ -5,23 +5,384 @@
     <p:sldMasterId id="2147483648" r:id="rId2"/>
     <p:sldMasterId id="2147483661" r:id="rId3"/>
   </p:sldMasterIdLst>
+  <p:notesMasterIdLst>
+    <p:notesMasterId r:id="rId4"/>
+  </p:notesMasterIdLst>
   <p:sldIdLst>
-    <p:sldId id="256" r:id="rId4"/>
-    <p:sldId id="257" r:id="rId5"/>
-    <p:sldId id="258" r:id="rId6"/>
-    <p:sldId id="259" r:id="rId7"/>
-    <p:sldId id="260" r:id="rId8"/>
-    <p:sldId id="261" r:id="rId9"/>
-    <p:sldId id="262" r:id="rId10"/>
-    <p:sldId id="263" r:id="rId11"/>
-    <p:sldId id="264" r:id="rId12"/>
-    <p:sldId id="265" r:id="rId13"/>
-    <p:sldId id="266" r:id="rId14"/>
-    <p:sldId id="267" r:id="rId15"/>
+    <p:sldId id="256" r:id="rId5"/>
+    <p:sldId id="257" r:id="rId6"/>
+    <p:sldId id="258" r:id="rId7"/>
+    <p:sldId id="259" r:id="rId8"/>
+    <p:sldId id="260" r:id="rId9"/>
+    <p:sldId id="261" r:id="rId10"/>
+    <p:sldId id="262" r:id="rId11"/>
+    <p:sldId id="263" r:id="rId12"/>
+    <p:sldId id="264" r:id="rId13"/>
+    <p:sldId id="265" r:id="rId14"/>
+    <p:sldId id="266" r:id="rId15"/>
+    <p:sldId id="267" r:id="rId16"/>
   </p:sldIdLst>
   <p:sldSz cx="12192000" cy="6858000"/>
   <p:notesSz cx="7772400" cy="10058400"/>
 </p:presentation>
+</file>
+
+<file path=ppt/notesMasters/notesMaster1.xml><?xml version="1.0" encoding="utf-8"?>
+<p:notesMaster xmlns:a="http://schemas.openxmlformats.org/drawingml/2006/main" xmlns:p="http://schemas.openxmlformats.org/presentationml/2006/main" xmlns:r="http://schemas.openxmlformats.org/officeDocument/2006/relationships" xmlns:p14="http://schemas.microsoft.com/office/powerpoint/2010/main" xmlns:p15="http://schemas.microsoft.com/office/powerpoint/2012/main" xmlns:mc="http://schemas.openxmlformats.org/markup-compatibility/2006">
+  <p:cSld>
+    <p:spTree>
+      <p:nvGrpSpPr>
+        <p:cNvPr id="1" name=""/>
+        <p:cNvGrpSpPr/>
+        <p:nvPr/>
+      </p:nvGrpSpPr>
+      <p:grpSpPr>
+        <a:xfrm>
+          <a:off x="0" y="0"/>
+          <a:ext cx="0" cy="0"/>
+          <a:chOff x="0" y="0"/>
+          <a:chExt cx="0" cy="0"/>
+        </a:xfrm>
+      </p:grpSpPr>
+      <p:sp>
+        <p:nvSpPr>
+          <p:cNvPr id="76" name="PlaceHolder 1"/>
+          <p:cNvSpPr>
+            <a:spLocks noGrp="1"/>
+          </p:cNvSpPr>
+          <p:nvPr>
+            <p:ph type="body"/>
+          </p:nvPr>
+        </p:nvSpPr>
+        <p:spPr>
+          <a:xfrm>
+            <a:off x="777240" y="4777560"/>
+            <a:ext cx="6217560" cy="4525920"/>
+          </a:xfrm>
+          <a:prstGeom prst="rect">
+            <a:avLst/>
+          </a:prstGeom>
+        </p:spPr>
+        <p:txBody>
+          <a:bodyPr lIns="0" rIns="0" tIns="0" bIns="0"/>
+          <a:p>
+            <a:r>
+              <a:rPr b="0" lang="pt-PT" sz="2000" spc="-1" strike="noStrike">
+                <a:latin typeface="DejaVu Sans"/>
+              </a:rPr>
+              <a:t>Click to edit the notes format</a:t>
+            </a:r>
+            <a:endParaRPr b="0" lang="pt-PT" sz="2000" spc="-1" strike="noStrike">
+              <a:latin typeface="DejaVu Sans"/>
+            </a:endParaRPr>
+          </a:p>
+        </p:txBody>
+      </p:sp>
+      <p:sp>
+        <p:nvSpPr>
+          <p:cNvPr id="77" name="PlaceHolder 2"/>
+          <p:cNvSpPr>
+            <a:spLocks noGrp="1"/>
+          </p:cNvSpPr>
+          <p:nvPr>
+            <p:ph type="hdr"/>
+          </p:nvPr>
+        </p:nvSpPr>
+        <p:spPr>
+          <a:xfrm>
+            <a:off x="1554480" y="5532120"/>
+            <a:ext cx="6217560" cy="4525920"/>
+          </a:xfrm>
+          <a:prstGeom prst="rect">
+            <a:avLst/>
+          </a:prstGeom>
+        </p:spPr>
+        <p:txBody>
+          <a:bodyPr lIns="0" rIns="0" tIns="0" bIns="0"/>
+          <a:p>
+            <a:r>
+              <a:rPr b="0" lang="pt-PT" sz="1400" spc="-1" strike="noStrike">
+                <a:latin typeface="DejaVu Serif"/>
+              </a:rPr>
+              <a:t>&lt;header&gt;</a:t>
+            </a:r>
+            <a:endParaRPr b="0" lang="pt-PT" sz="1400" spc="-1" strike="noStrike">
+              <a:latin typeface="DejaVu Serif"/>
+            </a:endParaRPr>
+          </a:p>
+        </p:txBody>
+      </p:sp>
+      <p:sp>
+        <p:nvSpPr>
+          <p:cNvPr id="78" name="PlaceHolder 3"/>
+          <p:cNvSpPr>
+            <a:spLocks noGrp="1"/>
+          </p:cNvSpPr>
+          <p:nvPr>
+            <p:ph type="dt"/>
+          </p:nvPr>
+        </p:nvSpPr>
+        <p:spPr>
+          <a:xfrm>
+            <a:off x="0" y="9555480"/>
+            <a:ext cx="3372840" cy="502560"/>
+          </a:xfrm>
+          <a:prstGeom prst="rect">
+            <a:avLst/>
+          </a:prstGeom>
+        </p:spPr>
+        <p:txBody>
+          <a:bodyPr lIns="0" rIns="0" tIns="0" bIns="0"/>
+          <a:p>
+            <a:pPr algn="r"/>
+            <a:r>
+              <a:rPr b="0" lang="pt-PT" sz="1400" spc="-1" strike="noStrike">
+                <a:latin typeface="DejaVu Serif"/>
+              </a:rPr>
+              <a:t>&lt;date/time&gt;</a:t>
+            </a:r>
+            <a:endParaRPr b="0" lang="pt-PT" sz="1400" spc="-1" strike="noStrike">
+              <a:latin typeface="DejaVu Serif"/>
+            </a:endParaRPr>
+          </a:p>
+        </p:txBody>
+      </p:sp>
+      <p:sp>
+        <p:nvSpPr>
+          <p:cNvPr id="79" name="PlaceHolder 4"/>
+          <p:cNvSpPr>
+            <a:spLocks noGrp="1"/>
+          </p:cNvSpPr>
+          <p:nvPr>
+            <p:ph type="ftr"/>
+          </p:nvPr>
+        </p:nvSpPr>
+        <p:spPr>
+          <a:xfrm>
+            <a:off x="0" y="0"/>
+            <a:ext cx="3372840" cy="502560"/>
+          </a:xfrm>
+          <a:prstGeom prst="rect">
+            <a:avLst/>
+          </a:prstGeom>
+        </p:spPr>
+        <p:txBody>
+          <a:bodyPr lIns="0" rIns="0" tIns="0" bIns="0" anchor="b"/>
+          <a:p>
+            <a:r>
+              <a:rPr b="0" lang="pt-PT" sz="1400" spc="-1" strike="noStrike">
+                <a:latin typeface="DejaVu Serif"/>
+              </a:rPr>
+              <a:t>&lt;footer&gt;</a:t>
+            </a:r>
+            <a:endParaRPr b="0" lang="pt-PT" sz="1400" spc="-1" strike="noStrike">
+              <a:latin typeface="DejaVu Serif"/>
+            </a:endParaRPr>
+          </a:p>
+        </p:txBody>
+      </p:sp>
+      <p:sp>
+        <p:nvSpPr>
+          <p:cNvPr id="80" name="PlaceHolder 5"/>
+          <p:cNvSpPr>
+            <a:spLocks noGrp="1"/>
+          </p:cNvSpPr>
+          <p:nvPr>
+            <p:ph type="sldNum"/>
+          </p:nvPr>
+        </p:nvSpPr>
+        <p:spPr>
+          <a:xfrm>
+            <a:off x="4399200" y="0"/>
+            <a:ext cx="3372840" cy="502560"/>
+          </a:xfrm>
+          <a:prstGeom prst="rect">
+            <a:avLst/>
+          </a:prstGeom>
+        </p:spPr>
+        <p:txBody>
+          <a:bodyPr lIns="0" rIns="0" tIns="0" bIns="0" anchor="b"/>
+          <a:p>
+            <a:pPr algn="r"/>
+            <a:fld id="{51B3DFFE-CAE7-4608-9200-55208D698917}" type="slidenum">
+              <a:rPr b="0" lang="pt-PT" sz="1400" spc="-1" strike="noStrike">
+                <a:latin typeface="DejaVu Serif"/>
+              </a:rPr>
+              <a:t>&lt;number&gt;</a:t>
+            </a:fld>
+            <a:endParaRPr b="0" lang="pt-PT" sz="1400" spc="-1" strike="noStrike">
+              <a:latin typeface="DejaVu Serif"/>
+            </a:endParaRPr>
+          </a:p>
+        </p:txBody>
+      </p:sp>
+    </p:spTree>
+  </p:cSld>
+  <p:clrMap bg1="lt1" bg2="lt2" tx1="dk1" tx2="dk2" accent1="accent1" accent2="accent2" accent3="accent3" accent4="accent4" accent5="accent5" accent6="accent6" hlink="hlink" folHlink="folHlink"/>
+</p:notesMaster>
+</file>
+
+<file path=ppt/notesSlides/notesSlide10.xml><?xml version="1.0" encoding="utf-8"?>
+<p:notes xmlns:a="http://schemas.openxmlformats.org/drawingml/2006/main" xmlns:p="http://schemas.openxmlformats.org/presentationml/2006/main" xmlns:r="http://schemas.openxmlformats.org/officeDocument/2006/relationships" xmlns:p14="http://schemas.microsoft.com/office/powerpoint/2010/main" xmlns:p15="http://schemas.microsoft.com/office/powerpoint/2012/main" xmlns:mc="http://schemas.openxmlformats.org/markup-compatibility/2006">
+  <p:cSld>
+    <p:spTree>
+      <p:nvGrpSpPr>
+        <p:cNvPr id="1" name=""/>
+        <p:cNvGrpSpPr/>
+        <p:nvPr/>
+      </p:nvGrpSpPr>
+      <p:grpSpPr>
+        <a:xfrm>
+          <a:off x="0" y="0"/>
+          <a:ext cx="0" cy="0"/>
+          <a:chOff x="0" y="0"/>
+          <a:chExt cx="0" cy="0"/>
+        </a:xfrm>
+      </p:grpSpPr>
+      <p:sp>
+        <p:nvSpPr>
+          <p:cNvPr id="108" name="PlaceHolder 1"/>
+          <p:cNvSpPr>
+            <a:spLocks noGrp="1"/>
+          </p:cNvSpPr>
+          <p:nvPr>
+            <p:ph type="body"/>
+          </p:nvPr>
+        </p:nvSpPr>
+        <p:spPr>
+          <a:xfrm>
+            <a:off x="777240" y="4777560"/>
+            <a:ext cx="6217560" cy="4525920"/>
+          </a:xfrm>
+          <a:prstGeom prst="rect">
+            <a:avLst/>
+          </a:prstGeom>
+        </p:spPr>
+        <p:txBody>
+          <a:bodyPr tIns="91440" bIns="91440" anchor="ctr"/>
+          <a:p>
+            <a:pPr marL="216000" indent="-216000">
+              <a:lnSpc>
+                <a:spcPct val="100000"/>
+              </a:lnSpc>
+            </a:pPr>
+            <a:r>
+              <a:rPr b="0" lang="en-US" sz="1100" spc="-1" strike="noStrike">
+                <a:latin typeface="DejaVu Sans"/>
+              </a:rPr>
+              <a:t>Git: </a:t>
+            </a:r>
+            <a:r>
+              <a:rPr b="0" lang="en-US" sz="1100" spc="-1" strike="noStrike">
+                <a:latin typeface="DejaVu Sans"/>
+                <a:hlinkClick r:id="rId1"/>
+              </a:rPr>
+              <a:t>https://github.com/luisnabais/course_jenkins_code.git</a:t>
+            </a:r>
+            <a:endParaRPr b="0" lang="en-US" sz="1100" spc="-1" strike="noStrike">
+              <a:latin typeface="DejaVu Sans"/>
+            </a:endParaRPr>
+          </a:p>
+          <a:p>
+            <a:pPr marL="216000" indent="-216000">
+              <a:lnSpc>
+                <a:spcPct val="100000"/>
+              </a:lnSpc>
+            </a:pPr>
+            <a:endParaRPr b="0" lang="en-US" sz="1100" spc="-1" strike="noStrike">
+              <a:latin typeface="DejaVu Sans"/>
+            </a:endParaRPr>
+          </a:p>
+          <a:p>
+            <a:pPr marL="216000" indent="-216000">
+              <a:lnSpc>
+                <a:spcPct val="100000"/>
+              </a:lnSpc>
+            </a:pPr>
+            <a:endParaRPr b="0" lang="en-US" sz="1100" spc="-1" strike="noStrike">
+              <a:latin typeface="DejaVu Sans"/>
+            </a:endParaRPr>
+          </a:p>
+          <a:p>
+            <a:pPr marL="216000" indent="-216000">
+              <a:lnSpc>
+                <a:spcPct val="100000"/>
+              </a:lnSpc>
+            </a:pPr>
+            <a:r>
+              <a:rPr b="0" lang="en-US" sz="1100" spc="-1" strike="noStrike">
+                <a:latin typeface="DejaVu Sans"/>
+              </a:rPr>
+              <a:t>Build (</a:t>
+            </a:r>
+            <a:r>
+              <a:rPr b="0" lang="en-US" sz="1100" spc="-1" strike="noStrike" u="sng">
+                <a:uFillTx/>
+                <a:latin typeface="DejaVu Sans"/>
+              </a:rPr>
+              <a:t>Shell):</a:t>
+            </a:r>
+            <a:endParaRPr b="0" lang="en-US" sz="1100" spc="-1" strike="noStrike">
+              <a:latin typeface="DejaVu Sans"/>
+            </a:endParaRPr>
+          </a:p>
+          <a:p>
+            <a:pPr marL="216000" indent="-216000">
+              <a:lnSpc>
+                <a:spcPct val="100000"/>
+              </a:lnSpc>
+            </a:pPr>
+            <a:r>
+              <a:rPr b="0" lang="en-US" sz="1100" spc="-1" strike="noStrike">
+                <a:latin typeface="DejaVu Sans"/>
+              </a:rPr>
+              <a:t>ssh apache "rm -rf /var/www/html/*"</a:t>
+            </a:r>
+            <a:endParaRPr b="0" lang="en-US" sz="1100" spc="-1" strike="noStrike">
+              <a:latin typeface="DejaVu Sans"/>
+            </a:endParaRPr>
+          </a:p>
+          <a:p>
+            <a:pPr marL="216000" indent="-216000">
+              <a:lnSpc>
+                <a:spcPct val="100000"/>
+              </a:lnSpc>
+            </a:pPr>
+            <a:r>
+              <a:rPr b="0" lang="en-US" sz="1100" spc="-1" strike="noStrike">
+                <a:latin typeface="DejaVu Sans"/>
+              </a:rPr>
+              <a:t>scp * apache:/var/www/html/</a:t>
+            </a:r>
+            <a:endParaRPr b="0" lang="en-US" sz="1100" spc="-1" strike="noStrike">
+              <a:latin typeface="DejaVu Sans"/>
+            </a:endParaRPr>
+          </a:p>
+          <a:p>
+            <a:pPr marL="216000" indent="-216000">
+              <a:lnSpc>
+                <a:spcPct val="100000"/>
+              </a:lnSpc>
+            </a:pPr>
+            <a:endParaRPr b="0" lang="en-US" sz="1100" spc="-1" strike="noStrike">
+              <a:latin typeface="DejaVu Sans"/>
+            </a:endParaRPr>
+          </a:p>
+          <a:p>
+            <a:pPr marL="216000" indent="-216000">
+              <a:lnSpc>
+                <a:spcPct val="100000"/>
+              </a:lnSpc>
+            </a:pPr>
+            <a:endParaRPr b="0" lang="en-US" sz="1100" spc="-1" strike="noStrike">
+              <a:latin typeface="DejaVu Sans"/>
+            </a:endParaRPr>
+          </a:p>
+        </p:txBody>
+      </p:sp>
+    </p:spTree>
+  </p:cSld>
+</p:notes>
 </file>
 
 <file path=ppt/slideLayouts/slideLayout1.xml><?xml version="1.0" encoding="utf-8"?>
@@ -85,9 +446,11 @@
         <p:txBody>
           <a:bodyPr lIns="0" rIns="0" tIns="0" bIns="0" anchor="ctr"/>
           <a:p>
-            <a:pPr algn="ctr"/>
-            <a:endParaRPr b="0" lang="pt-PT" sz="4400" spc="-1" strike="noStrike">
-              <a:latin typeface="DejaVu Sans"/>
+            <a:endParaRPr b="0" lang="pt-PT" sz="1400" spc="-1" strike="noStrike">
+              <a:solidFill>
+                <a:srgbClr val="000000"/>
+              </a:solidFill>
+              <a:latin typeface="Arial"/>
             </a:endParaRPr>
           </a:p>
         </p:txBody>
@@ -116,8 +479,11 @@
             <a:normAutofit/>
           </a:bodyPr>
           <a:p>
-            <a:endParaRPr b="0" lang="pt-PT" sz="3200" spc="-1" strike="noStrike">
-              <a:latin typeface="DejaVu Sans"/>
+            <a:endParaRPr b="0" lang="pt-PT" sz="1400" spc="-1" strike="noStrike">
+              <a:solidFill>
+                <a:srgbClr val="000000"/>
+              </a:solidFill>
+              <a:latin typeface="Arial"/>
             </a:endParaRPr>
           </a:p>
         </p:txBody>
@@ -146,8 +512,11 @@
             <a:normAutofit/>
           </a:bodyPr>
           <a:p>
-            <a:endParaRPr b="0" lang="pt-PT" sz="3200" spc="-1" strike="noStrike">
-              <a:latin typeface="DejaVu Sans"/>
+            <a:endParaRPr b="0" lang="pt-PT" sz="1400" spc="-1" strike="noStrike">
+              <a:solidFill>
+                <a:srgbClr val="000000"/>
+              </a:solidFill>
+              <a:latin typeface="Arial"/>
             </a:endParaRPr>
           </a:p>
         </p:txBody>
@@ -196,9 +565,11 @@
         <p:txBody>
           <a:bodyPr lIns="0" rIns="0" tIns="0" bIns="0" anchor="ctr"/>
           <a:p>
-            <a:pPr algn="ctr"/>
-            <a:endParaRPr b="0" lang="pt-PT" sz="4400" spc="-1" strike="noStrike">
-              <a:latin typeface="DejaVu Sans"/>
+            <a:endParaRPr b="0" lang="pt-PT" sz="1400" spc="-1" strike="noStrike">
+              <a:solidFill>
+                <a:srgbClr val="000000"/>
+              </a:solidFill>
+              <a:latin typeface="Arial"/>
             </a:endParaRPr>
           </a:p>
         </p:txBody>
@@ -227,8 +598,11 @@
             <a:normAutofit/>
           </a:bodyPr>
           <a:p>
-            <a:endParaRPr b="0" lang="pt-PT" sz="3200" spc="-1" strike="noStrike">
-              <a:latin typeface="DejaVu Sans"/>
+            <a:endParaRPr b="0" lang="pt-PT" sz="1400" spc="-1" strike="noStrike">
+              <a:solidFill>
+                <a:srgbClr val="000000"/>
+              </a:solidFill>
+              <a:latin typeface="Arial"/>
             </a:endParaRPr>
           </a:p>
         </p:txBody>
@@ -257,8 +631,11 @@
             <a:normAutofit/>
           </a:bodyPr>
           <a:p>
-            <a:endParaRPr b="0" lang="pt-PT" sz="3200" spc="-1" strike="noStrike">
-              <a:latin typeface="DejaVu Sans"/>
+            <a:endParaRPr b="0" lang="pt-PT" sz="1400" spc="-1" strike="noStrike">
+              <a:solidFill>
+                <a:srgbClr val="000000"/>
+              </a:solidFill>
+              <a:latin typeface="Arial"/>
             </a:endParaRPr>
           </a:p>
         </p:txBody>
@@ -287,8 +664,11 @@
             <a:normAutofit/>
           </a:bodyPr>
           <a:p>
-            <a:endParaRPr b="0" lang="pt-PT" sz="3200" spc="-1" strike="noStrike">
-              <a:latin typeface="DejaVu Sans"/>
+            <a:endParaRPr b="0" lang="pt-PT" sz="1400" spc="-1" strike="noStrike">
+              <a:solidFill>
+                <a:srgbClr val="000000"/>
+              </a:solidFill>
+              <a:latin typeface="Arial"/>
             </a:endParaRPr>
           </a:p>
         </p:txBody>
@@ -317,8 +697,11 @@
             <a:normAutofit/>
           </a:bodyPr>
           <a:p>
-            <a:endParaRPr b="0" lang="pt-PT" sz="3200" spc="-1" strike="noStrike">
-              <a:latin typeface="DejaVu Sans"/>
+            <a:endParaRPr b="0" lang="pt-PT" sz="1400" spc="-1" strike="noStrike">
+              <a:solidFill>
+                <a:srgbClr val="000000"/>
+              </a:solidFill>
+              <a:latin typeface="Arial"/>
             </a:endParaRPr>
           </a:p>
         </p:txBody>
@@ -367,9 +750,11 @@
         <p:txBody>
           <a:bodyPr lIns="0" rIns="0" tIns="0" bIns="0" anchor="ctr"/>
           <a:p>
-            <a:pPr algn="ctr"/>
-            <a:endParaRPr b="0" lang="pt-PT" sz="4400" spc="-1" strike="noStrike">
-              <a:latin typeface="DejaVu Sans"/>
+            <a:endParaRPr b="0" lang="pt-PT" sz="1400" spc="-1" strike="noStrike">
+              <a:solidFill>
+                <a:srgbClr val="000000"/>
+              </a:solidFill>
+              <a:latin typeface="Arial"/>
             </a:endParaRPr>
           </a:p>
         </p:txBody>
@@ -398,8 +783,11 @@
             <a:normAutofit/>
           </a:bodyPr>
           <a:p>
-            <a:endParaRPr b="0" lang="pt-PT" sz="3200" spc="-1" strike="noStrike">
-              <a:latin typeface="DejaVu Sans"/>
+            <a:endParaRPr b="0" lang="pt-PT" sz="1400" spc="-1" strike="noStrike">
+              <a:solidFill>
+                <a:srgbClr val="000000"/>
+              </a:solidFill>
+              <a:latin typeface="Arial"/>
             </a:endParaRPr>
           </a:p>
         </p:txBody>
@@ -428,8 +816,11 @@
             <a:normAutofit/>
           </a:bodyPr>
           <a:p>
-            <a:endParaRPr b="0" lang="pt-PT" sz="3200" spc="-1" strike="noStrike">
-              <a:latin typeface="DejaVu Sans"/>
+            <a:endParaRPr b="0" lang="pt-PT" sz="1400" spc="-1" strike="noStrike">
+              <a:solidFill>
+                <a:srgbClr val="000000"/>
+              </a:solidFill>
+              <a:latin typeface="Arial"/>
             </a:endParaRPr>
           </a:p>
         </p:txBody>
@@ -458,8 +849,11 @@
             <a:normAutofit/>
           </a:bodyPr>
           <a:p>
-            <a:endParaRPr b="0" lang="pt-PT" sz="3200" spc="-1" strike="noStrike">
-              <a:latin typeface="DejaVu Sans"/>
+            <a:endParaRPr b="0" lang="pt-PT" sz="1400" spc="-1" strike="noStrike">
+              <a:solidFill>
+                <a:srgbClr val="000000"/>
+              </a:solidFill>
+              <a:latin typeface="Arial"/>
             </a:endParaRPr>
           </a:p>
         </p:txBody>
@@ -488,8 +882,11 @@
             <a:normAutofit/>
           </a:bodyPr>
           <a:p>
-            <a:endParaRPr b="0" lang="pt-PT" sz="3200" spc="-1" strike="noStrike">
-              <a:latin typeface="DejaVu Sans"/>
+            <a:endParaRPr b="0" lang="pt-PT" sz="1400" spc="-1" strike="noStrike">
+              <a:solidFill>
+                <a:srgbClr val="000000"/>
+              </a:solidFill>
+              <a:latin typeface="Arial"/>
             </a:endParaRPr>
           </a:p>
         </p:txBody>
@@ -518,8 +915,11 @@
             <a:normAutofit/>
           </a:bodyPr>
           <a:p>
-            <a:endParaRPr b="0" lang="pt-PT" sz="3200" spc="-1" strike="noStrike">
-              <a:latin typeface="DejaVu Sans"/>
+            <a:endParaRPr b="0" lang="pt-PT" sz="1400" spc="-1" strike="noStrike">
+              <a:solidFill>
+                <a:srgbClr val="000000"/>
+              </a:solidFill>
+              <a:latin typeface="Arial"/>
             </a:endParaRPr>
           </a:p>
         </p:txBody>
@@ -548,8 +948,11 @@
             <a:normAutofit/>
           </a:bodyPr>
           <a:p>
-            <a:endParaRPr b="0" lang="pt-PT" sz="3200" spc="-1" strike="noStrike">
-              <a:latin typeface="DejaVu Sans"/>
+            <a:endParaRPr b="0" lang="pt-PT" sz="1400" spc="-1" strike="noStrike">
+              <a:solidFill>
+                <a:srgbClr val="000000"/>
+              </a:solidFill>
+              <a:latin typeface="Arial"/>
             </a:endParaRPr>
           </a:p>
         </p:txBody>
@@ -620,9 +1023,11 @@
         <p:txBody>
           <a:bodyPr lIns="0" rIns="0" tIns="0" bIns="0" anchor="ctr"/>
           <a:p>
-            <a:pPr algn="ctr"/>
-            <a:endParaRPr b="0" lang="pt-PT" sz="4400" spc="-1" strike="noStrike">
-              <a:latin typeface="DejaVu Sans"/>
+            <a:endParaRPr b="0" lang="pt-PT" sz="1400" spc="-1" strike="noStrike">
+              <a:solidFill>
+                <a:srgbClr val="000000"/>
+              </a:solidFill>
+              <a:latin typeface="Arial"/>
             </a:endParaRPr>
           </a:p>
         </p:txBody>
@@ -700,9 +1105,11 @@
         <p:txBody>
           <a:bodyPr lIns="0" rIns="0" tIns="0" bIns="0" anchor="ctr"/>
           <a:p>
-            <a:pPr algn="ctr"/>
-            <a:endParaRPr b="0" lang="pt-PT" sz="4400" spc="-1" strike="noStrike">
-              <a:latin typeface="DejaVu Sans"/>
+            <a:endParaRPr b="0" lang="pt-PT" sz="1400" spc="-1" strike="noStrike">
+              <a:solidFill>
+                <a:srgbClr val="000000"/>
+              </a:solidFill>
+              <a:latin typeface="Arial"/>
             </a:endParaRPr>
           </a:p>
         </p:txBody>
@@ -731,8 +1138,11 @@
             <a:normAutofit/>
           </a:bodyPr>
           <a:p>
-            <a:endParaRPr b="0" lang="pt-PT" sz="3200" spc="-1" strike="noStrike">
-              <a:latin typeface="DejaVu Sans"/>
+            <a:endParaRPr b="0" lang="pt-PT" sz="1400" spc="-1" strike="noStrike">
+              <a:solidFill>
+                <a:srgbClr val="000000"/>
+              </a:solidFill>
+              <a:latin typeface="Arial"/>
             </a:endParaRPr>
           </a:p>
         </p:txBody>
@@ -781,9 +1191,11 @@
         <p:txBody>
           <a:bodyPr lIns="0" rIns="0" tIns="0" bIns="0" anchor="ctr"/>
           <a:p>
-            <a:pPr algn="ctr"/>
-            <a:endParaRPr b="0" lang="pt-PT" sz="4400" spc="-1" strike="noStrike">
-              <a:latin typeface="DejaVu Sans"/>
+            <a:endParaRPr b="0" lang="pt-PT" sz="1400" spc="-1" strike="noStrike">
+              <a:solidFill>
+                <a:srgbClr val="000000"/>
+              </a:solidFill>
+              <a:latin typeface="Arial"/>
             </a:endParaRPr>
           </a:p>
         </p:txBody>
@@ -812,8 +1224,11 @@
             <a:normAutofit/>
           </a:bodyPr>
           <a:p>
-            <a:endParaRPr b="0" lang="pt-PT" sz="3200" spc="-1" strike="noStrike">
-              <a:latin typeface="DejaVu Sans"/>
+            <a:endParaRPr b="0" lang="pt-PT" sz="1400" spc="-1" strike="noStrike">
+              <a:solidFill>
+                <a:srgbClr val="000000"/>
+              </a:solidFill>
+              <a:latin typeface="Arial"/>
             </a:endParaRPr>
           </a:p>
         </p:txBody>
@@ -842,8 +1257,11 @@
             <a:normAutofit/>
           </a:bodyPr>
           <a:p>
-            <a:endParaRPr b="0" lang="pt-PT" sz="3200" spc="-1" strike="noStrike">
-              <a:latin typeface="DejaVu Sans"/>
+            <a:endParaRPr b="0" lang="pt-PT" sz="1400" spc="-1" strike="noStrike">
+              <a:solidFill>
+                <a:srgbClr val="000000"/>
+              </a:solidFill>
+              <a:latin typeface="Arial"/>
             </a:endParaRPr>
           </a:p>
         </p:txBody>
@@ -892,9 +1310,11 @@
         <p:txBody>
           <a:bodyPr lIns="0" rIns="0" tIns="0" bIns="0" anchor="ctr"/>
           <a:p>
-            <a:pPr algn="ctr"/>
-            <a:endParaRPr b="0" lang="pt-PT" sz="4400" spc="-1" strike="noStrike">
-              <a:latin typeface="DejaVu Sans"/>
+            <a:endParaRPr b="0" lang="pt-PT" sz="1400" spc="-1" strike="noStrike">
+              <a:solidFill>
+                <a:srgbClr val="000000"/>
+              </a:solidFill>
+              <a:latin typeface="Arial"/>
             </a:endParaRPr>
           </a:p>
         </p:txBody>
@@ -994,9 +1414,11 @@
         <p:txBody>
           <a:bodyPr lIns="0" rIns="0" tIns="0" bIns="0" anchor="ctr"/>
           <a:p>
-            <a:pPr algn="ctr"/>
-            <a:endParaRPr b="0" lang="pt-PT" sz="4400" spc="-1" strike="noStrike">
-              <a:latin typeface="DejaVu Sans"/>
+            <a:endParaRPr b="0" lang="pt-PT" sz="1400" spc="-1" strike="noStrike">
+              <a:solidFill>
+                <a:srgbClr val="000000"/>
+              </a:solidFill>
+              <a:latin typeface="Arial"/>
             </a:endParaRPr>
           </a:p>
         </p:txBody>
@@ -1025,8 +1447,11 @@
             <a:normAutofit/>
           </a:bodyPr>
           <a:p>
-            <a:endParaRPr b="0" lang="pt-PT" sz="3200" spc="-1" strike="noStrike">
-              <a:latin typeface="DejaVu Sans"/>
+            <a:endParaRPr b="0" lang="pt-PT" sz="1400" spc="-1" strike="noStrike">
+              <a:solidFill>
+                <a:srgbClr val="000000"/>
+              </a:solidFill>
+              <a:latin typeface="Arial"/>
             </a:endParaRPr>
           </a:p>
         </p:txBody>
@@ -1055,8 +1480,11 @@
             <a:normAutofit/>
           </a:bodyPr>
           <a:p>
-            <a:endParaRPr b="0" lang="pt-PT" sz="3200" spc="-1" strike="noStrike">
-              <a:latin typeface="DejaVu Sans"/>
+            <a:endParaRPr b="0" lang="pt-PT" sz="1400" spc="-1" strike="noStrike">
+              <a:solidFill>
+                <a:srgbClr val="000000"/>
+              </a:solidFill>
+              <a:latin typeface="Arial"/>
             </a:endParaRPr>
           </a:p>
         </p:txBody>
@@ -1085,8 +1513,11 @@
             <a:normAutofit/>
           </a:bodyPr>
           <a:p>
-            <a:endParaRPr b="0" lang="pt-PT" sz="3200" spc="-1" strike="noStrike">
-              <a:latin typeface="DejaVu Sans"/>
+            <a:endParaRPr b="0" lang="pt-PT" sz="1400" spc="-1" strike="noStrike">
+              <a:solidFill>
+                <a:srgbClr val="000000"/>
+              </a:solidFill>
+              <a:latin typeface="Arial"/>
             </a:endParaRPr>
           </a:p>
         </p:txBody>
@@ -1135,9 +1566,11 @@
         <p:txBody>
           <a:bodyPr lIns="0" rIns="0" tIns="0" bIns="0" anchor="ctr"/>
           <a:p>
-            <a:pPr algn="ctr"/>
-            <a:endParaRPr b="0" lang="pt-PT" sz="4400" spc="-1" strike="noStrike">
-              <a:latin typeface="DejaVu Sans"/>
+            <a:endParaRPr b="0" lang="pt-PT" sz="1400" spc="-1" strike="noStrike">
+              <a:solidFill>
+                <a:srgbClr val="000000"/>
+              </a:solidFill>
+              <a:latin typeface="Arial"/>
             </a:endParaRPr>
           </a:p>
         </p:txBody>
@@ -1215,9 +1648,11 @@
         <p:txBody>
           <a:bodyPr lIns="0" rIns="0" tIns="0" bIns="0" anchor="ctr"/>
           <a:p>
-            <a:pPr algn="ctr"/>
-            <a:endParaRPr b="0" lang="pt-PT" sz="4400" spc="-1" strike="noStrike">
-              <a:latin typeface="DejaVu Sans"/>
+            <a:endParaRPr b="0" lang="pt-PT" sz="1400" spc="-1" strike="noStrike">
+              <a:solidFill>
+                <a:srgbClr val="000000"/>
+              </a:solidFill>
+              <a:latin typeface="Arial"/>
             </a:endParaRPr>
           </a:p>
         </p:txBody>
@@ -1246,8 +1681,11 @@
             <a:normAutofit/>
           </a:bodyPr>
           <a:p>
-            <a:endParaRPr b="0" lang="pt-PT" sz="3200" spc="-1" strike="noStrike">
-              <a:latin typeface="DejaVu Sans"/>
+            <a:endParaRPr b="0" lang="pt-PT" sz="1400" spc="-1" strike="noStrike">
+              <a:solidFill>
+                <a:srgbClr val="000000"/>
+              </a:solidFill>
+              <a:latin typeface="Arial"/>
             </a:endParaRPr>
           </a:p>
         </p:txBody>
@@ -1276,8 +1714,11 @@
             <a:normAutofit/>
           </a:bodyPr>
           <a:p>
-            <a:endParaRPr b="0" lang="pt-PT" sz="3200" spc="-1" strike="noStrike">
-              <a:latin typeface="DejaVu Sans"/>
+            <a:endParaRPr b="0" lang="pt-PT" sz="1400" spc="-1" strike="noStrike">
+              <a:solidFill>
+                <a:srgbClr val="000000"/>
+              </a:solidFill>
+              <a:latin typeface="Arial"/>
             </a:endParaRPr>
           </a:p>
         </p:txBody>
@@ -1306,8 +1747,11 @@
             <a:normAutofit/>
           </a:bodyPr>
           <a:p>
-            <a:endParaRPr b="0" lang="pt-PT" sz="3200" spc="-1" strike="noStrike">
-              <a:latin typeface="DejaVu Sans"/>
+            <a:endParaRPr b="0" lang="pt-PT" sz="1400" spc="-1" strike="noStrike">
+              <a:solidFill>
+                <a:srgbClr val="000000"/>
+              </a:solidFill>
+              <a:latin typeface="Arial"/>
             </a:endParaRPr>
           </a:p>
         </p:txBody>
@@ -1356,9 +1800,11 @@
         <p:txBody>
           <a:bodyPr lIns="0" rIns="0" tIns="0" bIns="0" anchor="ctr"/>
           <a:p>
-            <a:pPr algn="ctr"/>
-            <a:endParaRPr b="0" lang="pt-PT" sz="4400" spc="-1" strike="noStrike">
-              <a:latin typeface="DejaVu Sans"/>
+            <a:endParaRPr b="0" lang="pt-PT" sz="1400" spc="-1" strike="noStrike">
+              <a:solidFill>
+                <a:srgbClr val="000000"/>
+              </a:solidFill>
+              <a:latin typeface="Arial"/>
             </a:endParaRPr>
           </a:p>
         </p:txBody>
@@ -1387,8 +1833,11 @@
             <a:normAutofit/>
           </a:bodyPr>
           <a:p>
-            <a:endParaRPr b="0" lang="pt-PT" sz="3200" spc="-1" strike="noStrike">
-              <a:latin typeface="DejaVu Sans"/>
+            <a:endParaRPr b="0" lang="pt-PT" sz="1400" spc="-1" strike="noStrike">
+              <a:solidFill>
+                <a:srgbClr val="000000"/>
+              </a:solidFill>
+              <a:latin typeface="Arial"/>
             </a:endParaRPr>
           </a:p>
         </p:txBody>
@@ -1417,8 +1866,11 @@
             <a:normAutofit/>
           </a:bodyPr>
           <a:p>
-            <a:endParaRPr b="0" lang="pt-PT" sz="3200" spc="-1" strike="noStrike">
-              <a:latin typeface="DejaVu Sans"/>
+            <a:endParaRPr b="0" lang="pt-PT" sz="1400" spc="-1" strike="noStrike">
+              <a:solidFill>
+                <a:srgbClr val="000000"/>
+              </a:solidFill>
+              <a:latin typeface="Arial"/>
             </a:endParaRPr>
           </a:p>
         </p:txBody>
@@ -1447,8 +1899,11 @@
             <a:normAutofit/>
           </a:bodyPr>
           <a:p>
-            <a:endParaRPr b="0" lang="pt-PT" sz="3200" spc="-1" strike="noStrike">
-              <a:latin typeface="DejaVu Sans"/>
+            <a:endParaRPr b="0" lang="pt-PT" sz="1400" spc="-1" strike="noStrike">
+              <a:solidFill>
+                <a:srgbClr val="000000"/>
+              </a:solidFill>
+              <a:latin typeface="Arial"/>
             </a:endParaRPr>
           </a:p>
         </p:txBody>
@@ -1497,9 +1952,11 @@
         <p:txBody>
           <a:bodyPr lIns="0" rIns="0" tIns="0" bIns="0" anchor="ctr"/>
           <a:p>
-            <a:pPr algn="ctr"/>
-            <a:endParaRPr b="0" lang="pt-PT" sz="4400" spc="-1" strike="noStrike">
-              <a:latin typeface="DejaVu Sans"/>
+            <a:endParaRPr b="0" lang="pt-PT" sz="1400" spc="-1" strike="noStrike">
+              <a:solidFill>
+                <a:srgbClr val="000000"/>
+              </a:solidFill>
+              <a:latin typeface="Arial"/>
             </a:endParaRPr>
           </a:p>
         </p:txBody>
@@ -1528,8 +1985,11 @@
             <a:normAutofit/>
           </a:bodyPr>
           <a:p>
-            <a:endParaRPr b="0" lang="pt-PT" sz="3200" spc="-1" strike="noStrike">
-              <a:latin typeface="DejaVu Sans"/>
+            <a:endParaRPr b="0" lang="pt-PT" sz="1400" spc="-1" strike="noStrike">
+              <a:solidFill>
+                <a:srgbClr val="000000"/>
+              </a:solidFill>
+              <a:latin typeface="Arial"/>
             </a:endParaRPr>
           </a:p>
         </p:txBody>
@@ -1558,8 +2018,11 @@
             <a:normAutofit/>
           </a:bodyPr>
           <a:p>
-            <a:endParaRPr b="0" lang="pt-PT" sz="3200" spc="-1" strike="noStrike">
-              <a:latin typeface="DejaVu Sans"/>
+            <a:endParaRPr b="0" lang="pt-PT" sz="1400" spc="-1" strike="noStrike">
+              <a:solidFill>
+                <a:srgbClr val="000000"/>
+              </a:solidFill>
+              <a:latin typeface="Arial"/>
             </a:endParaRPr>
           </a:p>
         </p:txBody>
@@ -1608,9 +2071,11 @@
         <p:txBody>
           <a:bodyPr lIns="0" rIns="0" tIns="0" bIns="0" anchor="ctr"/>
           <a:p>
-            <a:pPr algn="ctr"/>
-            <a:endParaRPr b="0" lang="pt-PT" sz="4400" spc="-1" strike="noStrike">
-              <a:latin typeface="DejaVu Sans"/>
+            <a:endParaRPr b="0" lang="pt-PT" sz="1400" spc="-1" strike="noStrike">
+              <a:solidFill>
+                <a:srgbClr val="000000"/>
+              </a:solidFill>
+              <a:latin typeface="Arial"/>
             </a:endParaRPr>
           </a:p>
         </p:txBody>
@@ -1639,8 +2104,11 @@
             <a:normAutofit/>
           </a:bodyPr>
           <a:p>
-            <a:endParaRPr b="0" lang="pt-PT" sz="3200" spc="-1" strike="noStrike">
-              <a:latin typeface="DejaVu Sans"/>
+            <a:endParaRPr b="0" lang="pt-PT" sz="1400" spc="-1" strike="noStrike">
+              <a:solidFill>
+                <a:srgbClr val="000000"/>
+              </a:solidFill>
+              <a:latin typeface="Arial"/>
             </a:endParaRPr>
           </a:p>
         </p:txBody>
@@ -1669,8 +2137,11 @@
             <a:normAutofit/>
           </a:bodyPr>
           <a:p>
-            <a:endParaRPr b="0" lang="pt-PT" sz="3200" spc="-1" strike="noStrike">
-              <a:latin typeface="DejaVu Sans"/>
+            <a:endParaRPr b="0" lang="pt-PT" sz="1400" spc="-1" strike="noStrike">
+              <a:solidFill>
+                <a:srgbClr val="000000"/>
+              </a:solidFill>
+              <a:latin typeface="Arial"/>
             </a:endParaRPr>
           </a:p>
         </p:txBody>
@@ -1699,8 +2170,11 @@
             <a:normAutofit/>
           </a:bodyPr>
           <a:p>
-            <a:endParaRPr b="0" lang="pt-PT" sz="3200" spc="-1" strike="noStrike">
-              <a:latin typeface="DejaVu Sans"/>
+            <a:endParaRPr b="0" lang="pt-PT" sz="1400" spc="-1" strike="noStrike">
+              <a:solidFill>
+                <a:srgbClr val="000000"/>
+              </a:solidFill>
+              <a:latin typeface="Arial"/>
             </a:endParaRPr>
           </a:p>
         </p:txBody>
@@ -1729,8 +2203,11 @@
             <a:normAutofit/>
           </a:bodyPr>
           <a:p>
-            <a:endParaRPr b="0" lang="pt-PT" sz="3200" spc="-1" strike="noStrike">
-              <a:latin typeface="DejaVu Sans"/>
+            <a:endParaRPr b="0" lang="pt-PT" sz="1400" spc="-1" strike="noStrike">
+              <a:solidFill>
+                <a:srgbClr val="000000"/>
+              </a:solidFill>
+              <a:latin typeface="Arial"/>
             </a:endParaRPr>
           </a:p>
         </p:txBody>
@@ -1779,9 +2256,11 @@
         <p:txBody>
           <a:bodyPr lIns="0" rIns="0" tIns="0" bIns="0" anchor="ctr"/>
           <a:p>
-            <a:pPr algn="ctr"/>
-            <a:endParaRPr b="0" lang="pt-PT" sz="4400" spc="-1" strike="noStrike">
-              <a:latin typeface="DejaVu Sans"/>
+            <a:endParaRPr b="0" lang="pt-PT" sz="1400" spc="-1" strike="noStrike">
+              <a:solidFill>
+                <a:srgbClr val="000000"/>
+              </a:solidFill>
+              <a:latin typeface="Arial"/>
             </a:endParaRPr>
           </a:p>
         </p:txBody>
@@ -1810,8 +2289,11 @@
             <a:normAutofit/>
           </a:bodyPr>
           <a:p>
-            <a:endParaRPr b="0" lang="pt-PT" sz="3200" spc="-1" strike="noStrike">
-              <a:latin typeface="DejaVu Sans"/>
+            <a:endParaRPr b="0" lang="pt-PT" sz="1400" spc="-1" strike="noStrike">
+              <a:solidFill>
+                <a:srgbClr val="000000"/>
+              </a:solidFill>
+              <a:latin typeface="Arial"/>
             </a:endParaRPr>
           </a:p>
         </p:txBody>
@@ -1840,8 +2322,11 @@
             <a:normAutofit/>
           </a:bodyPr>
           <a:p>
-            <a:endParaRPr b="0" lang="pt-PT" sz="3200" spc="-1" strike="noStrike">
-              <a:latin typeface="DejaVu Sans"/>
+            <a:endParaRPr b="0" lang="pt-PT" sz="1400" spc="-1" strike="noStrike">
+              <a:solidFill>
+                <a:srgbClr val="000000"/>
+              </a:solidFill>
+              <a:latin typeface="Arial"/>
             </a:endParaRPr>
           </a:p>
         </p:txBody>
@@ -1870,8 +2355,11 @@
             <a:normAutofit/>
           </a:bodyPr>
           <a:p>
-            <a:endParaRPr b="0" lang="pt-PT" sz="3200" spc="-1" strike="noStrike">
-              <a:latin typeface="DejaVu Sans"/>
+            <a:endParaRPr b="0" lang="pt-PT" sz="1400" spc="-1" strike="noStrike">
+              <a:solidFill>
+                <a:srgbClr val="000000"/>
+              </a:solidFill>
+              <a:latin typeface="Arial"/>
             </a:endParaRPr>
           </a:p>
         </p:txBody>
@@ -1900,8 +2388,11 @@
             <a:normAutofit/>
           </a:bodyPr>
           <a:p>
-            <a:endParaRPr b="0" lang="pt-PT" sz="3200" spc="-1" strike="noStrike">
-              <a:latin typeface="DejaVu Sans"/>
+            <a:endParaRPr b="0" lang="pt-PT" sz="1400" spc="-1" strike="noStrike">
+              <a:solidFill>
+                <a:srgbClr val="000000"/>
+              </a:solidFill>
+              <a:latin typeface="Arial"/>
             </a:endParaRPr>
           </a:p>
         </p:txBody>
@@ -1930,8 +2421,11 @@
             <a:normAutofit/>
           </a:bodyPr>
           <a:p>
-            <a:endParaRPr b="0" lang="pt-PT" sz="3200" spc="-1" strike="noStrike">
-              <a:latin typeface="DejaVu Sans"/>
+            <a:endParaRPr b="0" lang="pt-PT" sz="1400" spc="-1" strike="noStrike">
+              <a:solidFill>
+                <a:srgbClr val="000000"/>
+              </a:solidFill>
+              <a:latin typeface="Arial"/>
             </a:endParaRPr>
           </a:p>
         </p:txBody>
@@ -1960,8 +2454,11 @@
             <a:normAutofit/>
           </a:bodyPr>
           <a:p>
-            <a:endParaRPr b="0" lang="pt-PT" sz="3200" spc="-1" strike="noStrike">
-              <a:latin typeface="DejaVu Sans"/>
+            <a:endParaRPr b="0" lang="pt-PT" sz="1400" spc="-1" strike="noStrike">
+              <a:solidFill>
+                <a:srgbClr val="000000"/>
+              </a:solidFill>
+              <a:latin typeface="Arial"/>
             </a:endParaRPr>
           </a:p>
         </p:txBody>
@@ -2010,9 +2507,11 @@
         <p:txBody>
           <a:bodyPr lIns="0" rIns="0" tIns="0" bIns="0" anchor="ctr"/>
           <a:p>
-            <a:pPr algn="ctr"/>
-            <a:endParaRPr b="0" lang="pt-PT" sz="4400" spc="-1" strike="noStrike">
-              <a:latin typeface="DejaVu Sans"/>
+            <a:endParaRPr b="0" lang="pt-PT" sz="1400" spc="-1" strike="noStrike">
+              <a:solidFill>
+                <a:srgbClr val="000000"/>
+              </a:solidFill>
+              <a:latin typeface="Arial"/>
             </a:endParaRPr>
           </a:p>
         </p:txBody>
@@ -2041,8 +2540,11 @@
             <a:normAutofit/>
           </a:bodyPr>
           <a:p>
-            <a:endParaRPr b="0" lang="pt-PT" sz="3200" spc="-1" strike="noStrike">
-              <a:latin typeface="DejaVu Sans"/>
+            <a:endParaRPr b="0" lang="pt-PT" sz="1400" spc="-1" strike="noStrike">
+              <a:solidFill>
+                <a:srgbClr val="000000"/>
+              </a:solidFill>
+              <a:latin typeface="Arial"/>
             </a:endParaRPr>
           </a:p>
         </p:txBody>
@@ -2091,9 +2593,11 @@
         <p:txBody>
           <a:bodyPr lIns="0" rIns="0" tIns="0" bIns="0" anchor="ctr"/>
           <a:p>
-            <a:pPr algn="ctr"/>
-            <a:endParaRPr b="0" lang="pt-PT" sz="4400" spc="-1" strike="noStrike">
-              <a:latin typeface="DejaVu Sans"/>
+            <a:endParaRPr b="0" lang="pt-PT" sz="1400" spc="-1" strike="noStrike">
+              <a:solidFill>
+                <a:srgbClr val="000000"/>
+              </a:solidFill>
+              <a:latin typeface="Arial"/>
             </a:endParaRPr>
           </a:p>
         </p:txBody>
@@ -2122,8 +2626,11 @@
             <a:normAutofit/>
           </a:bodyPr>
           <a:p>
-            <a:endParaRPr b="0" lang="pt-PT" sz="3200" spc="-1" strike="noStrike">
-              <a:latin typeface="DejaVu Sans"/>
+            <a:endParaRPr b="0" lang="pt-PT" sz="1400" spc="-1" strike="noStrike">
+              <a:solidFill>
+                <a:srgbClr val="000000"/>
+              </a:solidFill>
+              <a:latin typeface="Arial"/>
             </a:endParaRPr>
           </a:p>
         </p:txBody>
@@ -2152,8 +2659,11 @@
             <a:normAutofit/>
           </a:bodyPr>
           <a:p>
-            <a:endParaRPr b="0" lang="pt-PT" sz="3200" spc="-1" strike="noStrike">
-              <a:latin typeface="DejaVu Sans"/>
+            <a:endParaRPr b="0" lang="pt-PT" sz="1400" spc="-1" strike="noStrike">
+              <a:solidFill>
+                <a:srgbClr val="000000"/>
+              </a:solidFill>
+              <a:latin typeface="Arial"/>
             </a:endParaRPr>
           </a:p>
         </p:txBody>
@@ -2202,9 +2712,11 @@
         <p:txBody>
           <a:bodyPr lIns="0" rIns="0" tIns="0" bIns="0" anchor="ctr"/>
           <a:p>
-            <a:pPr algn="ctr"/>
-            <a:endParaRPr b="0" lang="pt-PT" sz="4400" spc="-1" strike="noStrike">
-              <a:latin typeface="DejaVu Sans"/>
+            <a:endParaRPr b="0" lang="pt-PT" sz="1400" spc="-1" strike="noStrike">
+              <a:solidFill>
+                <a:srgbClr val="000000"/>
+              </a:solidFill>
+              <a:latin typeface="Arial"/>
             </a:endParaRPr>
           </a:p>
         </p:txBody>
@@ -2304,9 +2816,11 @@
         <p:txBody>
           <a:bodyPr lIns="0" rIns="0" tIns="0" bIns="0" anchor="ctr"/>
           <a:p>
-            <a:pPr algn="ctr"/>
-            <a:endParaRPr b="0" lang="pt-PT" sz="4400" spc="-1" strike="noStrike">
-              <a:latin typeface="DejaVu Sans"/>
+            <a:endParaRPr b="0" lang="pt-PT" sz="1400" spc="-1" strike="noStrike">
+              <a:solidFill>
+                <a:srgbClr val="000000"/>
+              </a:solidFill>
+              <a:latin typeface="Arial"/>
             </a:endParaRPr>
           </a:p>
         </p:txBody>
@@ -2335,8 +2849,11 @@
             <a:normAutofit/>
           </a:bodyPr>
           <a:p>
-            <a:endParaRPr b="0" lang="pt-PT" sz="3200" spc="-1" strike="noStrike">
-              <a:latin typeface="DejaVu Sans"/>
+            <a:endParaRPr b="0" lang="pt-PT" sz="1400" spc="-1" strike="noStrike">
+              <a:solidFill>
+                <a:srgbClr val="000000"/>
+              </a:solidFill>
+              <a:latin typeface="Arial"/>
             </a:endParaRPr>
           </a:p>
         </p:txBody>
@@ -2365,8 +2882,11 @@
             <a:normAutofit/>
           </a:bodyPr>
           <a:p>
-            <a:endParaRPr b="0" lang="pt-PT" sz="3200" spc="-1" strike="noStrike">
-              <a:latin typeface="DejaVu Sans"/>
+            <a:endParaRPr b="0" lang="pt-PT" sz="1400" spc="-1" strike="noStrike">
+              <a:solidFill>
+                <a:srgbClr val="000000"/>
+              </a:solidFill>
+              <a:latin typeface="Arial"/>
             </a:endParaRPr>
           </a:p>
         </p:txBody>
@@ -2395,8 +2915,11 @@
             <a:normAutofit/>
           </a:bodyPr>
           <a:p>
-            <a:endParaRPr b="0" lang="pt-PT" sz="3200" spc="-1" strike="noStrike">
-              <a:latin typeface="DejaVu Sans"/>
+            <a:endParaRPr b="0" lang="pt-PT" sz="1400" spc="-1" strike="noStrike">
+              <a:solidFill>
+                <a:srgbClr val="000000"/>
+              </a:solidFill>
+              <a:latin typeface="Arial"/>
             </a:endParaRPr>
           </a:p>
         </p:txBody>
@@ -2445,9 +2968,11 @@
         <p:txBody>
           <a:bodyPr lIns="0" rIns="0" tIns="0" bIns="0" anchor="ctr"/>
           <a:p>
-            <a:pPr algn="ctr"/>
-            <a:endParaRPr b="0" lang="pt-PT" sz="4400" spc="-1" strike="noStrike">
-              <a:latin typeface="DejaVu Sans"/>
+            <a:endParaRPr b="0" lang="pt-PT" sz="1400" spc="-1" strike="noStrike">
+              <a:solidFill>
+                <a:srgbClr val="000000"/>
+              </a:solidFill>
+              <a:latin typeface="Arial"/>
             </a:endParaRPr>
           </a:p>
         </p:txBody>
@@ -2476,8 +3001,11 @@
             <a:normAutofit/>
           </a:bodyPr>
           <a:p>
-            <a:endParaRPr b="0" lang="pt-PT" sz="3200" spc="-1" strike="noStrike">
-              <a:latin typeface="DejaVu Sans"/>
+            <a:endParaRPr b="0" lang="pt-PT" sz="1400" spc="-1" strike="noStrike">
+              <a:solidFill>
+                <a:srgbClr val="000000"/>
+              </a:solidFill>
+              <a:latin typeface="Arial"/>
             </a:endParaRPr>
           </a:p>
         </p:txBody>
@@ -2506,8 +3034,11 @@
             <a:normAutofit/>
           </a:bodyPr>
           <a:p>
-            <a:endParaRPr b="0" lang="pt-PT" sz="3200" spc="-1" strike="noStrike">
-              <a:latin typeface="DejaVu Sans"/>
+            <a:endParaRPr b="0" lang="pt-PT" sz="1400" spc="-1" strike="noStrike">
+              <a:solidFill>
+                <a:srgbClr val="000000"/>
+              </a:solidFill>
+              <a:latin typeface="Arial"/>
             </a:endParaRPr>
           </a:p>
         </p:txBody>
@@ -2536,8 +3067,11 @@
             <a:normAutofit/>
           </a:bodyPr>
           <a:p>
-            <a:endParaRPr b="0" lang="pt-PT" sz="3200" spc="-1" strike="noStrike">
-              <a:latin typeface="DejaVu Sans"/>
+            <a:endParaRPr b="0" lang="pt-PT" sz="1400" spc="-1" strike="noStrike">
+              <a:solidFill>
+                <a:srgbClr val="000000"/>
+              </a:solidFill>
+              <a:latin typeface="Arial"/>
             </a:endParaRPr>
           </a:p>
         </p:txBody>
@@ -2586,9 +3120,11 @@
         <p:txBody>
           <a:bodyPr lIns="0" rIns="0" tIns="0" bIns="0" anchor="ctr"/>
           <a:p>
-            <a:pPr algn="ctr"/>
-            <a:endParaRPr b="0" lang="pt-PT" sz="4400" spc="-1" strike="noStrike">
-              <a:latin typeface="DejaVu Sans"/>
+            <a:endParaRPr b="0" lang="pt-PT" sz="1400" spc="-1" strike="noStrike">
+              <a:solidFill>
+                <a:srgbClr val="000000"/>
+              </a:solidFill>
+              <a:latin typeface="Arial"/>
             </a:endParaRPr>
           </a:p>
         </p:txBody>
@@ -2617,8 +3153,11 @@
             <a:normAutofit/>
           </a:bodyPr>
           <a:p>
-            <a:endParaRPr b="0" lang="pt-PT" sz="3200" spc="-1" strike="noStrike">
-              <a:latin typeface="DejaVu Sans"/>
+            <a:endParaRPr b="0" lang="pt-PT" sz="1400" spc="-1" strike="noStrike">
+              <a:solidFill>
+                <a:srgbClr val="000000"/>
+              </a:solidFill>
+              <a:latin typeface="Arial"/>
             </a:endParaRPr>
           </a:p>
         </p:txBody>
@@ -2647,8 +3186,11 @@
             <a:normAutofit/>
           </a:bodyPr>
           <a:p>
-            <a:endParaRPr b="0" lang="pt-PT" sz="3200" spc="-1" strike="noStrike">
-              <a:latin typeface="DejaVu Sans"/>
+            <a:endParaRPr b="0" lang="pt-PT" sz="1400" spc="-1" strike="noStrike">
+              <a:solidFill>
+                <a:srgbClr val="000000"/>
+              </a:solidFill>
+              <a:latin typeface="Arial"/>
             </a:endParaRPr>
           </a:p>
         </p:txBody>
@@ -2677,8 +3219,11 @@
             <a:normAutofit/>
           </a:bodyPr>
           <a:p>
-            <a:endParaRPr b="0" lang="pt-PT" sz="3200" spc="-1" strike="noStrike">
-              <a:latin typeface="DejaVu Sans"/>
+            <a:endParaRPr b="0" lang="pt-PT" sz="1400" spc="-1" strike="noStrike">
+              <a:solidFill>
+                <a:srgbClr val="000000"/>
+              </a:solidFill>
+              <a:latin typeface="Arial"/>
             </a:endParaRPr>
           </a:p>
         </p:txBody>
@@ -2724,8 +3269,8 @@
         </p:nvSpPr>
         <p:spPr>
           <a:xfrm>
-            <a:off x="609480" y="273600"/>
-            <a:ext cx="10972080" cy="1144440"/>
+            <a:off x="838080" y="365040"/>
+            <a:ext cx="10514880" cy="1324800"/>
           </a:xfrm>
           <a:prstGeom prst="rect">
             <a:avLst/>
@@ -2735,13 +3280,19 @@
           <a:bodyPr lIns="0" rIns="0" tIns="0" bIns="0" anchor="ctr"/>
           <a:p>
             <a:r>
-              <a:rPr b="0" lang="pt-PT" sz="1800" spc="-1" strike="noStrike">
-                <a:latin typeface="DejaVu Sans"/>
+              <a:rPr b="0" lang="pt-PT" sz="1400" spc="-1" strike="noStrike">
+                <a:solidFill>
+                  <a:srgbClr val="000000"/>
+                </a:solidFill>
+                <a:latin typeface="Arial"/>
               </a:rPr>
               <a:t>Click to edit the title text format</a:t>
             </a:r>
-            <a:endParaRPr b="0" lang="pt-PT" sz="1800" spc="-1" strike="noStrike">
-              <a:latin typeface="DejaVu Sans"/>
+            <a:endParaRPr b="0" lang="pt-PT" sz="1400" spc="-1" strike="noStrike">
+              <a:solidFill>
+                <a:srgbClr val="000000"/>
+              </a:solidFill>
+              <a:latin typeface="Arial"/>
             </a:endParaRPr>
           </a:p>
         </p:txBody>
@@ -2759,7 +3310,7 @@
         <p:spPr>
           <a:xfrm>
             <a:off x="609480" y="1604520"/>
-            <a:ext cx="10972080" cy="3976920"/>
+            <a:ext cx="10972440" cy="3977280"/>
           </a:xfrm>
           <a:prstGeom prst="rect">
             <a:avLst/>
@@ -2782,13 +3333,19 @@
               <a:buChar char=""/>
             </a:pPr>
             <a:r>
-              <a:rPr b="0" lang="pt-PT" sz="1800" spc="-1" strike="noStrike">
-                <a:latin typeface="DejaVu Sans"/>
+              <a:rPr b="0" lang="pt-PT" sz="1400" spc="-1" strike="noStrike">
+                <a:solidFill>
+                  <a:srgbClr val="000000"/>
+                </a:solidFill>
+                <a:latin typeface="Arial"/>
               </a:rPr>
               <a:t>Click to edit the outline text format</a:t>
             </a:r>
-            <a:endParaRPr b="0" lang="pt-PT" sz="1800" spc="-1" strike="noStrike">
-              <a:latin typeface="DejaVu Sans"/>
+            <a:endParaRPr b="0" lang="pt-PT" sz="1400" spc="-1" strike="noStrike">
+              <a:solidFill>
+                <a:srgbClr val="000000"/>
+              </a:solidFill>
+              <a:latin typeface="Arial"/>
             </a:endParaRPr>
           </a:p>
           <a:p>
@@ -2804,13 +3361,19 @@
               <a:buChar char=""/>
             </a:pPr>
             <a:r>
-              <a:rPr b="0" lang="pt-PT" sz="1800" spc="-1" strike="noStrike">
-                <a:latin typeface="DejaVu Sans"/>
+              <a:rPr b="0" lang="pt-PT" sz="1400" spc="-1" strike="noStrike">
+                <a:solidFill>
+                  <a:srgbClr val="000000"/>
+                </a:solidFill>
+                <a:latin typeface="Arial"/>
               </a:rPr>
               <a:t>Second Outline Level</a:t>
             </a:r>
-            <a:endParaRPr b="0" lang="pt-PT" sz="1800" spc="-1" strike="noStrike">
-              <a:latin typeface="DejaVu Sans"/>
+            <a:endParaRPr b="0" lang="pt-PT" sz="1400" spc="-1" strike="noStrike">
+              <a:solidFill>
+                <a:srgbClr val="000000"/>
+              </a:solidFill>
+              <a:latin typeface="Arial"/>
             </a:endParaRPr>
           </a:p>
           <a:p>
@@ -2826,13 +3389,19 @@
               <a:buChar char=""/>
             </a:pPr>
             <a:r>
-              <a:rPr b="0" lang="pt-PT" sz="1800" spc="-1" strike="noStrike">
-                <a:latin typeface="DejaVu Sans"/>
+              <a:rPr b="0" lang="pt-PT" sz="1400" spc="-1" strike="noStrike">
+                <a:solidFill>
+                  <a:srgbClr val="000000"/>
+                </a:solidFill>
+                <a:latin typeface="Arial"/>
               </a:rPr>
               <a:t>Third Outline Level</a:t>
             </a:r>
-            <a:endParaRPr b="0" lang="pt-PT" sz="1800" spc="-1" strike="noStrike">
-              <a:latin typeface="DejaVu Sans"/>
+            <a:endParaRPr b="0" lang="pt-PT" sz="1400" spc="-1" strike="noStrike">
+              <a:solidFill>
+                <a:srgbClr val="000000"/>
+              </a:solidFill>
+              <a:latin typeface="Arial"/>
             </a:endParaRPr>
           </a:p>
           <a:p>
@@ -2848,13 +3417,19 @@
               <a:buChar char=""/>
             </a:pPr>
             <a:r>
-              <a:rPr b="0" lang="pt-PT" sz="1800" spc="-1" strike="noStrike">
-                <a:latin typeface="DejaVu Sans"/>
+              <a:rPr b="0" lang="pt-PT" sz="1400" spc="-1" strike="noStrike">
+                <a:solidFill>
+                  <a:srgbClr val="000000"/>
+                </a:solidFill>
+                <a:latin typeface="Arial"/>
               </a:rPr>
               <a:t>Fourth Outline Level</a:t>
             </a:r>
-            <a:endParaRPr b="0" lang="pt-PT" sz="1800" spc="-1" strike="noStrike">
-              <a:latin typeface="DejaVu Sans"/>
+            <a:endParaRPr b="0" lang="pt-PT" sz="1400" spc="-1" strike="noStrike">
+              <a:solidFill>
+                <a:srgbClr val="000000"/>
+              </a:solidFill>
+              <a:latin typeface="Arial"/>
             </a:endParaRPr>
           </a:p>
           <a:p>
@@ -2870,13 +3445,19 @@
               <a:buChar char=""/>
             </a:pPr>
             <a:r>
-              <a:rPr b="0" lang="pt-PT" sz="1800" spc="-1" strike="noStrike">
-                <a:latin typeface="DejaVu Sans"/>
+              <a:rPr b="0" lang="pt-PT" sz="2000" spc="-1" strike="noStrike">
+                <a:solidFill>
+                  <a:srgbClr val="000000"/>
+                </a:solidFill>
+                <a:latin typeface="Arial"/>
               </a:rPr>
               <a:t>Fifth Outline Level</a:t>
             </a:r>
-            <a:endParaRPr b="0" lang="pt-PT" sz="1800" spc="-1" strike="noStrike">
-              <a:latin typeface="DejaVu Sans"/>
+            <a:endParaRPr b="0" lang="pt-PT" sz="2000" spc="-1" strike="noStrike">
+              <a:solidFill>
+                <a:srgbClr val="000000"/>
+              </a:solidFill>
+              <a:latin typeface="Arial"/>
             </a:endParaRPr>
           </a:p>
           <a:p>
@@ -2892,13 +3473,19 @@
               <a:buChar char=""/>
             </a:pPr>
             <a:r>
-              <a:rPr b="0" lang="pt-PT" sz="1800" spc="-1" strike="noStrike">
-                <a:latin typeface="DejaVu Sans"/>
+              <a:rPr b="0" lang="pt-PT" sz="2000" spc="-1" strike="noStrike">
+                <a:solidFill>
+                  <a:srgbClr val="000000"/>
+                </a:solidFill>
+                <a:latin typeface="Arial"/>
               </a:rPr>
               <a:t>Sixth Outline Level</a:t>
             </a:r>
-            <a:endParaRPr b="0" lang="pt-PT" sz="1800" spc="-1" strike="noStrike">
-              <a:latin typeface="DejaVu Sans"/>
+            <a:endParaRPr b="0" lang="pt-PT" sz="2000" spc="-1" strike="noStrike">
+              <a:solidFill>
+                <a:srgbClr val="000000"/>
+              </a:solidFill>
+              <a:latin typeface="Arial"/>
             </a:endParaRPr>
           </a:p>
           <a:p>
@@ -2914,13 +3501,19 @@
               <a:buChar char=""/>
             </a:pPr>
             <a:r>
-              <a:rPr b="0" lang="pt-PT" sz="1800" spc="-1" strike="noStrike">
-                <a:latin typeface="DejaVu Sans"/>
+              <a:rPr b="0" lang="pt-PT" sz="2000" spc="-1" strike="noStrike">
+                <a:solidFill>
+                  <a:srgbClr val="000000"/>
+                </a:solidFill>
+                <a:latin typeface="Arial"/>
               </a:rPr>
               <a:t>Seventh Outline Level</a:t>
             </a:r>
-            <a:endParaRPr b="0" lang="pt-PT" sz="1800" spc="-1" strike="noStrike">
-              <a:latin typeface="DejaVu Sans"/>
+            <a:endParaRPr b="0" lang="pt-PT" sz="2000" spc="-1" strike="noStrike">
+              <a:solidFill>
+                <a:srgbClr val="000000"/>
+              </a:solidFill>
+              <a:latin typeface="Arial"/>
             </a:endParaRPr>
           </a:p>
         </p:txBody>
@@ -2991,15 +3584,20 @@
         <p:txBody>
           <a:bodyPr lIns="0" rIns="0" tIns="0" bIns="0" anchor="ctr"/>
           <a:p>
-            <a:pPr algn="ctr"/>
-            <a:r>
-              <a:rPr b="0" lang="pt-PT" sz="4400" spc="-1" strike="noStrike">
-                <a:latin typeface="DejaVu Sans"/>
+            <a:r>
+              <a:rPr b="0" lang="pt-PT" sz="1400" spc="-1" strike="noStrike">
+                <a:solidFill>
+                  <a:srgbClr val="000000"/>
+                </a:solidFill>
+                <a:latin typeface="Arial"/>
               </a:rPr>
               <a:t>Click to edit the title text format</a:t>
             </a:r>
-            <a:endParaRPr b="0" lang="pt-PT" sz="4400" spc="-1" strike="noStrike">
-              <a:latin typeface="DejaVu Sans"/>
+            <a:endParaRPr b="0" lang="pt-PT" sz="1400" spc="-1" strike="noStrike">
+              <a:solidFill>
+                <a:srgbClr val="000000"/>
+              </a:solidFill>
+              <a:latin typeface="Arial"/>
             </a:endParaRPr>
           </a:p>
         </p:txBody>
@@ -3040,13 +3638,19 @@
               <a:buChar char=""/>
             </a:pPr>
             <a:r>
-              <a:rPr b="0" lang="pt-PT" sz="3200" spc="-1" strike="noStrike">
-                <a:latin typeface="DejaVu Sans"/>
+              <a:rPr b="0" lang="pt-PT" sz="1400" spc="-1" strike="noStrike">
+                <a:solidFill>
+                  <a:srgbClr val="000000"/>
+                </a:solidFill>
+                <a:latin typeface="Arial"/>
               </a:rPr>
               <a:t>Click to edit the outline text format</a:t>
             </a:r>
-            <a:endParaRPr b="0" lang="pt-PT" sz="3200" spc="-1" strike="noStrike">
-              <a:latin typeface="DejaVu Sans"/>
+            <a:endParaRPr b="0" lang="pt-PT" sz="1400" spc="-1" strike="noStrike">
+              <a:solidFill>
+                <a:srgbClr val="000000"/>
+              </a:solidFill>
+              <a:latin typeface="Arial"/>
             </a:endParaRPr>
           </a:p>
           <a:p>
@@ -3062,13 +3666,19 @@
               <a:buChar char=""/>
             </a:pPr>
             <a:r>
-              <a:rPr b="0" lang="pt-PT" sz="2800" spc="-1" strike="noStrike">
-                <a:latin typeface="DejaVu Sans"/>
+              <a:rPr b="0" lang="pt-PT" sz="1400" spc="-1" strike="noStrike">
+                <a:solidFill>
+                  <a:srgbClr val="000000"/>
+                </a:solidFill>
+                <a:latin typeface="Arial"/>
               </a:rPr>
               <a:t>Second Outline Level</a:t>
             </a:r>
-            <a:endParaRPr b="0" lang="pt-PT" sz="2800" spc="-1" strike="noStrike">
-              <a:latin typeface="DejaVu Sans"/>
+            <a:endParaRPr b="0" lang="pt-PT" sz="1400" spc="-1" strike="noStrike">
+              <a:solidFill>
+                <a:srgbClr val="000000"/>
+              </a:solidFill>
+              <a:latin typeface="Arial"/>
             </a:endParaRPr>
           </a:p>
           <a:p>
@@ -3084,13 +3694,19 @@
               <a:buChar char=""/>
             </a:pPr>
             <a:r>
-              <a:rPr b="0" lang="pt-PT" sz="2400" spc="-1" strike="noStrike">
-                <a:latin typeface="DejaVu Sans"/>
+              <a:rPr b="0" lang="pt-PT" sz="1400" spc="-1" strike="noStrike">
+                <a:solidFill>
+                  <a:srgbClr val="000000"/>
+                </a:solidFill>
+                <a:latin typeface="Arial"/>
               </a:rPr>
               <a:t>Third Outline Level</a:t>
             </a:r>
-            <a:endParaRPr b="0" lang="pt-PT" sz="2400" spc="-1" strike="noStrike">
-              <a:latin typeface="DejaVu Sans"/>
+            <a:endParaRPr b="0" lang="pt-PT" sz="1400" spc="-1" strike="noStrike">
+              <a:solidFill>
+                <a:srgbClr val="000000"/>
+              </a:solidFill>
+              <a:latin typeface="Arial"/>
             </a:endParaRPr>
           </a:p>
           <a:p>
@@ -3106,13 +3722,19 @@
               <a:buChar char=""/>
             </a:pPr>
             <a:r>
-              <a:rPr b="0" lang="pt-PT" sz="2000" spc="-1" strike="noStrike">
-                <a:latin typeface="DejaVu Sans"/>
+              <a:rPr b="0" lang="pt-PT" sz="1400" spc="-1" strike="noStrike">
+                <a:solidFill>
+                  <a:srgbClr val="000000"/>
+                </a:solidFill>
+                <a:latin typeface="Arial"/>
               </a:rPr>
               <a:t>Fourth Outline Level</a:t>
             </a:r>
-            <a:endParaRPr b="0" lang="pt-PT" sz="2000" spc="-1" strike="noStrike">
-              <a:latin typeface="DejaVu Sans"/>
+            <a:endParaRPr b="0" lang="pt-PT" sz="1400" spc="-1" strike="noStrike">
+              <a:solidFill>
+                <a:srgbClr val="000000"/>
+              </a:solidFill>
+              <a:latin typeface="Arial"/>
             </a:endParaRPr>
           </a:p>
           <a:p>
@@ -3129,12 +3751,18 @@
             </a:pPr>
             <a:r>
               <a:rPr b="0" lang="pt-PT" sz="2000" spc="-1" strike="noStrike">
-                <a:latin typeface="DejaVu Sans"/>
+                <a:solidFill>
+                  <a:srgbClr val="000000"/>
+                </a:solidFill>
+                <a:latin typeface="Arial"/>
               </a:rPr>
               <a:t>Fifth Outline Level</a:t>
             </a:r>
             <a:endParaRPr b="0" lang="pt-PT" sz="2000" spc="-1" strike="noStrike">
-              <a:latin typeface="DejaVu Sans"/>
+              <a:solidFill>
+                <a:srgbClr val="000000"/>
+              </a:solidFill>
+              <a:latin typeface="Arial"/>
             </a:endParaRPr>
           </a:p>
           <a:p>
@@ -3151,12 +3779,18 @@
             </a:pPr>
             <a:r>
               <a:rPr b="0" lang="pt-PT" sz="2000" spc="-1" strike="noStrike">
-                <a:latin typeface="DejaVu Sans"/>
+                <a:solidFill>
+                  <a:srgbClr val="000000"/>
+                </a:solidFill>
+                <a:latin typeface="Arial"/>
               </a:rPr>
               <a:t>Sixth Outline Level</a:t>
             </a:r>
             <a:endParaRPr b="0" lang="pt-PT" sz="2000" spc="-1" strike="noStrike">
-              <a:latin typeface="DejaVu Sans"/>
+              <a:solidFill>
+                <a:srgbClr val="000000"/>
+              </a:solidFill>
+              <a:latin typeface="Arial"/>
             </a:endParaRPr>
           </a:p>
           <a:p>
@@ -3173,12 +3807,18 @@
             </a:pPr>
             <a:r>
               <a:rPr b="0" lang="pt-PT" sz="2000" spc="-1" strike="noStrike">
-                <a:latin typeface="DejaVu Sans"/>
+                <a:solidFill>
+                  <a:srgbClr val="000000"/>
+                </a:solidFill>
+                <a:latin typeface="Arial"/>
               </a:rPr>
               <a:t>Seventh Outline Level</a:t>
             </a:r>
             <a:endParaRPr b="0" lang="pt-PT" sz="2000" spc="-1" strike="noStrike">
-              <a:latin typeface="DejaVu Sans"/>
+              <a:solidFill>
+                <a:srgbClr val="000000"/>
+              </a:solidFill>
+              <a:latin typeface="Arial"/>
             </a:endParaRPr>
           </a:p>
         </p:txBody>
@@ -3232,14 +3872,14 @@
       </p:grpSpPr>
       <p:sp>
         <p:nvSpPr>
-          <p:cNvPr id="76" name="CustomShape 1"/>
+          <p:cNvPr id="81" name="CustomShape 1"/>
           <p:cNvSpPr/>
           <p:nvPr/>
         </p:nvSpPr>
         <p:spPr>
           <a:xfrm>
             <a:off x="8304480" y="6101280"/>
-            <a:ext cx="3656880" cy="639360"/>
+            <a:ext cx="3657240" cy="639720"/>
           </a:xfrm>
           <a:prstGeom prst="rect">
             <a:avLst/>
@@ -3264,7 +3904,7 @@
               </a:lnSpc>
             </a:pPr>
             <a:r>
-              <a:rPr b="1" lang="pt-PT" sz="3200" spc="-1" strike="noStrike">
+              <a:rPr b="1" lang="en-US" sz="3200" spc="-1" strike="noStrike">
                 <a:solidFill>
                   <a:srgbClr val="000000"/>
                 </a:solidFill>
@@ -3281,7 +3921,7 @@
       </p:sp>
       <p:pic>
         <p:nvPicPr>
-          <p:cNvPr id="77" name="" descr=""/>
+          <p:cNvPr id="82" name="" descr=""/>
           <p:cNvPicPr/>
           <p:nvPr/>
         </p:nvPicPr>
@@ -3292,7 +3932,7 @@
         <p:spPr>
           <a:xfrm>
             <a:off x="144000" y="4248000"/>
-            <a:ext cx="7199640" cy="2206440"/>
+            <a:ext cx="7200000" cy="2206800"/>
           </a:xfrm>
           <a:prstGeom prst="rect">
             <a:avLst/>
@@ -3304,14 +3944,14 @@
       </p:pic>
       <p:sp>
         <p:nvSpPr>
-          <p:cNvPr id="78" name="CustomShape 2"/>
-          <p:cNvSpPr/>
+          <p:cNvPr id="83" name="TextShape 2"/>
+          <p:cNvSpPr txBox="1"/>
           <p:nvPr/>
         </p:nvSpPr>
         <p:spPr>
           <a:xfrm>
             <a:off x="93240" y="6489360"/>
-            <a:ext cx="4946400" cy="446400"/>
+            <a:ext cx="4946760" cy="446760"/>
           </a:xfrm>
           <a:prstGeom prst="rect">
             <a:avLst/>
@@ -3321,12 +3961,6 @@
             <a:noFill/>
           </a:ln>
         </p:spPr>
-        <p:style>
-          <a:lnRef idx="0"/>
-          <a:fillRef idx="0"/>
-          <a:effectRef idx="0"/>
-          <a:fontRef idx="minor"/>
-        </p:style>
         <p:txBody>
           <a:bodyPr lIns="90000" rIns="90000" tIns="45000" bIns="45000"/>
           <a:p>
@@ -3434,14 +4068,14 @@
       </p:grpSpPr>
       <p:sp>
         <p:nvSpPr>
-          <p:cNvPr id="97" name="CustomShape 1"/>
+          <p:cNvPr id="102" name="CustomShape 1"/>
           <p:cNvSpPr/>
           <p:nvPr/>
         </p:nvSpPr>
         <p:spPr>
           <a:xfrm>
             <a:off x="182880" y="183240"/>
-            <a:ext cx="11703600" cy="6125760"/>
+            <a:ext cx="11703960" cy="6126120"/>
           </a:xfrm>
           <a:prstGeom prst="rect">
             <a:avLst/>
@@ -3466,7 +4100,7 @@
               </a:lnSpc>
             </a:pPr>
             <a:r>
-              <a:rPr b="1" lang="pt-PT" sz="2400" spc="-1" strike="noStrike">
+              <a:rPr b="1" lang="en-US" sz="2400" spc="-1" strike="noStrike">
                 <a:solidFill>
                   <a:srgbClr val="000000"/>
                 </a:solidFill>
@@ -3496,7 +4130,7 @@
               </a:lnSpc>
             </a:pPr>
             <a:r>
-              <a:rPr b="1" lang="pt-PT" sz="1600" spc="-1" strike="noStrike">
+              <a:rPr b="1" lang="en-US" sz="1600" spc="-1" strike="noStrike">
                 <a:solidFill>
                   <a:srgbClr val="000000"/>
                 </a:solidFill>
@@ -3510,7 +4144,7 @@
             </a:endParaRPr>
           </a:p>
           <a:p>
-            <a:pPr marL="216000" indent="-215640">
+            <a:pPr marL="216000" indent="-216000">
               <a:lnSpc>
                 <a:spcPct val="100000"/>
               </a:lnSpc>
@@ -3522,7 +4156,7 @@
               <a:buChar char=""/>
             </a:pPr>
             <a:r>
-              <a:rPr b="0" lang="pt-PT" sz="1600" spc="-1" strike="noStrike">
+              <a:rPr b="0" lang="en-US" sz="1600" spc="-1" strike="noStrike">
                 <a:solidFill>
                   <a:srgbClr val="000000"/>
                 </a:solidFill>
@@ -3536,7 +4170,7 @@
             </a:endParaRPr>
           </a:p>
           <a:p>
-            <a:pPr marL="216000" indent="-215640">
+            <a:pPr marL="216000" indent="-216000">
               <a:lnSpc>
                 <a:spcPct val="100000"/>
               </a:lnSpc>
@@ -3548,7 +4182,7 @@
               <a:buChar char=""/>
             </a:pPr>
             <a:r>
-              <a:rPr b="0" lang="pt-PT" sz="1600" spc="-1" strike="noStrike">
+              <a:rPr b="0" lang="en-US" sz="1600" spc="-1" strike="noStrike">
                 <a:solidFill>
                   <a:srgbClr val="000000"/>
                 </a:solidFill>
@@ -3562,7 +4196,7 @@
             </a:endParaRPr>
           </a:p>
           <a:p>
-            <a:pPr marL="216000" indent="-215640">
+            <a:pPr marL="216000" indent="-216000">
               <a:lnSpc>
                 <a:spcPct val="100000"/>
               </a:lnSpc>
@@ -3574,7 +4208,7 @@
               <a:buChar char=""/>
             </a:pPr>
             <a:r>
-              <a:rPr b="0" lang="pt-PT" sz="1600" spc="-1" strike="noStrike">
+              <a:rPr b="0" lang="en-US" sz="1600" spc="-1" strike="noStrike">
                 <a:solidFill>
                   <a:srgbClr val="000000"/>
                 </a:solidFill>
@@ -3604,7 +4238,7 @@
               </a:lnSpc>
             </a:pPr>
             <a:r>
-              <a:rPr b="1" lang="pt-PT" sz="1600" spc="-1" strike="noStrike">
+              <a:rPr b="1" lang="en-US" sz="1600" spc="-1" strike="noStrike">
                 <a:solidFill>
                   <a:srgbClr val="000000"/>
                 </a:solidFill>
@@ -3618,7 +4252,7 @@
             </a:endParaRPr>
           </a:p>
           <a:p>
-            <a:pPr marL="216000" indent="-215640">
+            <a:pPr marL="216000" indent="-216000">
               <a:lnSpc>
                 <a:spcPct val="100000"/>
               </a:lnSpc>
@@ -3630,7 +4264,7 @@
               <a:buChar char=""/>
             </a:pPr>
             <a:r>
-              <a:rPr b="0" lang="pt-PT" sz="1600" spc="-1" strike="noStrike">
+              <a:rPr b="0" lang="en-US" sz="1600" spc="-1" strike="noStrike">
                 <a:solidFill>
                   <a:srgbClr val="000000"/>
                 </a:solidFill>
@@ -3644,7 +4278,7 @@
             </a:endParaRPr>
           </a:p>
           <a:p>
-            <a:pPr marL="216000" indent="-215640">
+            <a:pPr marL="216000" indent="-216000">
               <a:lnSpc>
                 <a:spcPct val="100000"/>
               </a:lnSpc>
@@ -3656,7 +4290,7 @@
               <a:buChar char=""/>
             </a:pPr>
             <a:r>
-              <a:rPr b="0" lang="pt-PT" sz="1600" spc="-1" strike="noStrike">
+              <a:rPr b="0" lang="en-US" sz="1600" spc="-1" strike="noStrike">
                 <a:solidFill>
                   <a:srgbClr val="000000"/>
                 </a:solidFill>
@@ -3670,7 +4304,7 @@
             </a:endParaRPr>
           </a:p>
           <a:p>
-            <a:pPr marL="216000" indent="-215640">
+            <a:pPr marL="216000" indent="-216000">
               <a:lnSpc>
                 <a:spcPct val="100000"/>
               </a:lnSpc>
@@ -3682,7 +4316,7 @@
               <a:buChar char=""/>
             </a:pPr>
             <a:r>
-              <a:rPr b="0" lang="pt-PT" sz="1600" spc="-1" strike="noStrike">
+              <a:rPr b="0" lang="en-US" sz="1600" spc="-1" strike="noStrike">
                 <a:solidFill>
                   <a:srgbClr val="000000"/>
                 </a:solidFill>
@@ -3696,7 +4330,7 @@
             </a:endParaRPr>
           </a:p>
           <a:p>
-            <a:pPr marL="216000" indent="-215640">
+            <a:pPr marL="216000" indent="-216000">
               <a:lnSpc>
                 <a:spcPct val="100000"/>
               </a:lnSpc>
@@ -3708,7 +4342,7 @@
               <a:buChar char=""/>
             </a:pPr>
             <a:r>
-              <a:rPr b="0" lang="pt-PT" sz="1600" spc="-1" strike="noStrike">
+              <a:rPr b="0" lang="en-US" sz="1600" spc="-1" strike="noStrike">
                 <a:solidFill>
                   <a:srgbClr val="000000"/>
                 </a:solidFill>
@@ -3722,7 +4356,7 @@
             </a:endParaRPr>
           </a:p>
           <a:p>
-            <a:pPr lvl="1" marL="432000" indent="-215640">
+            <a:pPr lvl="1" marL="432000" indent="-216000">
               <a:lnSpc>
                 <a:spcPct val="100000"/>
               </a:lnSpc>
@@ -3734,7 +4368,7 @@
               <a:buChar char=""/>
             </a:pPr>
             <a:r>
-              <a:rPr b="0" lang="pt-PT" sz="1600" spc="-1" strike="noStrike">
+              <a:rPr b="0" lang="en-US" sz="1600" spc="-1" strike="noStrike">
                 <a:solidFill>
                   <a:srgbClr val="000000"/>
                 </a:solidFill>
@@ -3748,7 +4382,7 @@
             </a:endParaRPr>
           </a:p>
           <a:p>
-            <a:pPr lvl="1" marL="432000" indent="-215640">
+            <a:pPr lvl="1" marL="432000" indent="-216000">
               <a:lnSpc>
                 <a:spcPct val="100000"/>
               </a:lnSpc>
@@ -3760,7 +4394,7 @@
               <a:buChar char=""/>
             </a:pPr>
             <a:r>
-              <a:rPr b="0" lang="pt-PT" sz="1600" spc="-1" strike="noStrike">
+              <a:rPr b="0" lang="en-US" sz="1600" spc="-1" strike="noStrike">
                 <a:solidFill>
                   <a:srgbClr val="000000"/>
                 </a:solidFill>
@@ -3790,7 +4424,7 @@
               </a:lnSpc>
             </a:pPr>
             <a:r>
-              <a:rPr b="1" lang="pt-PT" sz="1600" spc="-1" strike="noStrike">
+              <a:rPr b="1" lang="en-US" sz="1600" spc="-1" strike="noStrike">
                 <a:solidFill>
                   <a:srgbClr val="000000"/>
                 </a:solidFill>
@@ -3804,7 +4438,7 @@
             </a:endParaRPr>
           </a:p>
           <a:p>
-            <a:pPr marL="216000" indent="-215640">
+            <a:pPr marL="216000" indent="-216000">
               <a:lnSpc>
                 <a:spcPct val="100000"/>
               </a:lnSpc>
@@ -3816,7 +4450,7 @@
               <a:buChar char=""/>
             </a:pPr>
             <a:r>
-              <a:rPr b="0" lang="pt-PT" sz="1600" spc="-1" strike="noStrike">
+              <a:rPr b="0" lang="en-US" sz="1600" spc="-1" strike="noStrike">
                 <a:solidFill>
                   <a:srgbClr val="000000"/>
                 </a:solidFill>
@@ -3830,7 +4464,7 @@
             </a:endParaRPr>
           </a:p>
           <a:p>
-            <a:pPr marL="216000" indent="-215640">
+            <a:pPr marL="216000" indent="-216000">
               <a:lnSpc>
                 <a:spcPct val="100000"/>
               </a:lnSpc>
@@ -3842,7 +4476,7 @@
               <a:buChar char=""/>
             </a:pPr>
             <a:r>
-              <a:rPr b="0" lang="pt-PT" sz="1600" spc="-1" strike="noStrike">
+              <a:rPr b="0" lang="en-US" sz="1600" spc="-1" strike="noStrike">
                 <a:solidFill>
                   <a:srgbClr val="000000"/>
                 </a:solidFill>
@@ -3859,7 +4493,7 @@
       </p:sp>
       <p:pic>
         <p:nvPicPr>
-          <p:cNvPr id="98" name="" descr=""/>
+          <p:cNvPr id="103" name="" descr=""/>
           <p:cNvPicPr/>
           <p:nvPr/>
         </p:nvPicPr>
@@ -3870,7 +4504,7 @@
         <p:spPr>
           <a:xfrm>
             <a:off x="11245680" y="100080"/>
-            <a:ext cx="814320" cy="1123920"/>
+            <a:ext cx="814680" cy="1124280"/>
           </a:xfrm>
           <a:prstGeom prst="rect">
             <a:avLst/>
@@ -3941,14 +4575,14 @@
       </p:grpSpPr>
       <p:sp>
         <p:nvSpPr>
-          <p:cNvPr id="99" name="CustomShape 1"/>
+          <p:cNvPr id="104" name="CustomShape 1"/>
           <p:cNvSpPr/>
           <p:nvPr/>
         </p:nvSpPr>
         <p:spPr>
           <a:xfrm>
             <a:off x="182880" y="183240"/>
-            <a:ext cx="11703600" cy="6125760"/>
+            <a:ext cx="11703960" cy="6126120"/>
           </a:xfrm>
           <a:prstGeom prst="rect">
             <a:avLst/>
@@ -3973,7 +4607,7 @@
               </a:lnSpc>
             </a:pPr>
             <a:r>
-              <a:rPr b="1" lang="pt-PT" sz="2400" spc="-1" strike="noStrike">
+              <a:rPr b="1" lang="en-US" sz="2400" spc="-1" strike="noStrike">
                 <a:solidFill>
                   <a:srgbClr val="000000"/>
                 </a:solidFill>
@@ -4013,7 +4647,7 @@
               </a:lnSpc>
             </a:pPr>
             <a:r>
-              <a:rPr b="1" lang="pt-PT" sz="1600" spc="-1" strike="noStrike">
+              <a:rPr b="1" lang="en-US" sz="1600" spc="-1" strike="noStrike">
                 <a:solidFill>
                   <a:srgbClr val="000000"/>
                 </a:solidFill>
@@ -4023,7 +4657,7 @@
               <a:t>Jenkins Documentation</a:t>
             </a:r>
             <a:r>
-              <a:rPr b="0" lang="pt-PT" sz="1600" spc="-1" strike="noStrike">
+              <a:rPr b="0" lang="en-US" sz="1600" spc="-1" strike="noStrike">
                 <a:solidFill>
                   <a:srgbClr val="000000"/>
                 </a:solidFill>
@@ -4033,11 +4667,10 @@
               <a:t>: </a:t>
             </a:r>
             <a:r>
-              <a:rPr b="0" lang="pt-PT" sz="1600" spc="-1" strike="noStrike" u="sng">
-                <a:solidFill>
-                  <a:srgbClr val="0000ff"/>
-                </a:solidFill>
-                <a:uFillTx/>
+              <a:rPr b="0" lang="en-US" sz="1600" spc="-1" strike="noStrike">
+                <a:solidFill>
+                  <a:srgbClr val="000000"/>
+                </a:solidFill>
                 <a:latin typeface="Verdana"/>
                 <a:ea typeface="Verdana"/>
                 <a:hlinkClick r:id="rId2"/>
@@ -4055,7 +4688,7 @@
               </a:lnSpc>
             </a:pPr>
             <a:r>
-              <a:rPr b="1" lang="pt-PT" sz="1600" spc="-1" strike="noStrike">
+              <a:rPr b="1" lang="en-US" sz="1600" spc="-1" strike="noStrike">
                 <a:solidFill>
                   <a:srgbClr val="000000"/>
                 </a:solidFill>
@@ -4065,7 +4698,7 @@
               <a:t>Jenkins Plugins: </a:t>
             </a:r>
             <a:r>
-              <a:rPr b="0" lang="pt-PT" sz="1600" spc="-1" strike="noStrike">
+              <a:rPr b="0" lang="en-US" sz="1600" spc="-1" strike="noStrike">
                 <a:solidFill>
                   <a:srgbClr val="000000"/>
                 </a:solidFill>
@@ -4075,11 +4708,10 @@
               <a:t> </a:t>
             </a:r>
             <a:r>
-              <a:rPr b="0" lang="pt-PT" sz="1600" spc="-1" strike="noStrike" u="sng">
-                <a:solidFill>
-                  <a:srgbClr val="0000ff"/>
-                </a:solidFill>
-                <a:uFillTx/>
+              <a:rPr b="0" lang="en-US" sz="1600" spc="-1" strike="noStrike">
+                <a:solidFill>
+                  <a:srgbClr val="000000"/>
+                </a:solidFill>
                 <a:latin typeface="Verdana"/>
                 <a:ea typeface="Verdana"/>
                 <a:hlinkClick r:id="rId3"/>
@@ -4117,7 +4749,7 @@
               </a:lnSpc>
             </a:pPr>
             <a:r>
-              <a:rPr b="1" lang="pt-PT" sz="1600" spc="-1" strike="noStrike">
+              <a:rPr b="1" lang="en-US" sz="1600" spc="-1" strike="noStrike">
                 <a:solidFill>
                   <a:srgbClr val="000000"/>
                 </a:solidFill>
@@ -4127,7 +4759,7 @@
               <a:t>Next steps</a:t>
             </a:r>
             <a:r>
-              <a:rPr b="0" lang="pt-PT" sz="1600" spc="-1" strike="noStrike">
+              <a:rPr b="0" lang="en-US" sz="1600" spc="-1" strike="noStrike">
                 <a:solidFill>
                   <a:srgbClr val="000000"/>
                 </a:solidFill>
@@ -4147,7 +4779,7 @@
               </a:lnSpc>
             </a:pPr>
             <a:r>
-              <a:rPr b="1" lang="pt-PT" sz="1600" spc="-1" strike="noStrike">
+              <a:rPr b="1" lang="en-US" sz="1600" spc="-1" strike="noStrike">
                 <a:solidFill>
                   <a:srgbClr val="000000"/>
                 </a:solidFill>
@@ -4157,7 +4789,7 @@
               <a:t>Jenkins Pipeline</a:t>
             </a:r>
             <a:r>
-              <a:rPr b="0" lang="pt-PT" sz="1600" spc="-1" strike="noStrike">
+              <a:rPr b="0" lang="en-US" sz="1600" spc="-1" strike="noStrike">
                 <a:solidFill>
                   <a:srgbClr val="000000"/>
                 </a:solidFill>
@@ -4167,11 +4799,10 @@
               <a:t>: </a:t>
             </a:r>
             <a:r>
-              <a:rPr b="0" lang="pt-PT" sz="1600" spc="-1" strike="noStrike" u="sng">
-                <a:solidFill>
-                  <a:srgbClr val="0000ff"/>
-                </a:solidFill>
-                <a:uFillTx/>
+              <a:rPr b="0" lang="en-US" sz="1600" spc="-1" strike="noStrike">
+                <a:solidFill>
+                  <a:srgbClr val="000000"/>
+                </a:solidFill>
                 <a:latin typeface="Verdana"/>
                 <a:ea typeface="Verdana"/>
                 <a:hlinkClick r:id="rId4"/>
@@ -4189,7 +4820,7 @@
               </a:lnSpc>
             </a:pPr>
             <a:r>
-              <a:rPr b="1" lang="pt-PT" sz="1600" spc="-1" strike="noStrike">
+              <a:rPr b="1" lang="en-US" sz="1600" spc="-1" strike="noStrike">
                 <a:solidFill>
                   <a:srgbClr val="000000"/>
                 </a:solidFill>
@@ -4199,7 +4830,7 @@
               <a:t>Jenkins Blue Ocean Project</a:t>
             </a:r>
             <a:r>
-              <a:rPr b="0" lang="pt-PT" sz="1600" spc="-1" strike="noStrike">
+              <a:rPr b="0" lang="en-US" sz="1600" spc="-1" strike="noStrike">
                 <a:solidFill>
                   <a:srgbClr val="000000"/>
                 </a:solidFill>
@@ -4209,11 +4840,10 @@
               <a:t>: </a:t>
             </a:r>
             <a:r>
-              <a:rPr b="0" lang="pt-PT" sz="1600" spc="-1" strike="noStrike" u="sng">
-                <a:solidFill>
-                  <a:srgbClr val="0000ff"/>
-                </a:solidFill>
-                <a:uFillTx/>
+              <a:rPr b="0" lang="en-US" sz="1600" spc="-1" strike="noStrike">
+                <a:solidFill>
+                  <a:srgbClr val="000000"/>
+                </a:solidFill>
                 <a:latin typeface="Verdana"/>
                 <a:ea typeface="Verdana"/>
                 <a:hlinkClick r:id="rId5"/>
@@ -4241,7 +4871,7 @@
               </a:lnSpc>
             </a:pPr>
             <a:r>
-              <a:rPr b="1" lang="pt-PT" sz="1600" spc="-1" strike="noStrike">
+              <a:rPr b="1" lang="en-US" sz="1600" spc="-1" strike="noStrike">
                 <a:solidFill>
                   <a:srgbClr val="000000"/>
                 </a:solidFill>
@@ -4255,7 +4885,7 @@
             </a:endParaRPr>
           </a:p>
           <a:p>
-            <a:pPr marL="216000" indent="-215640">
+            <a:pPr marL="216000" indent="-216000">
               <a:lnSpc>
                 <a:spcPct val="100000"/>
               </a:lnSpc>
@@ -4267,7 +4897,7 @@
               <a:buChar char=""/>
             </a:pPr>
             <a:r>
-              <a:rPr b="0" lang="pt-PT" sz="1600" spc="-1" strike="noStrike">
+              <a:rPr b="0" lang="en-US" sz="1600" spc="-1" strike="noStrike">
                 <a:solidFill>
                   <a:srgbClr val="000000"/>
                 </a:solidFill>
@@ -4281,7 +4911,7 @@
             </a:endParaRPr>
           </a:p>
           <a:p>
-            <a:pPr marL="216000" indent="-215640">
+            <a:pPr marL="216000" indent="-216000">
               <a:lnSpc>
                 <a:spcPct val="100000"/>
               </a:lnSpc>
@@ -4293,7 +4923,7 @@
               <a:buChar char=""/>
             </a:pPr>
             <a:r>
-              <a:rPr b="0" lang="pt-PT" sz="1600" spc="-1" strike="noStrike">
+              <a:rPr b="0" lang="en-US" sz="1600" spc="-1" strike="noStrike">
                 <a:solidFill>
                   <a:srgbClr val="000000"/>
                 </a:solidFill>
@@ -4310,14 +4940,14 @@
       </p:sp>
       <p:sp>
         <p:nvSpPr>
-          <p:cNvPr id="100" name="CustomShape 2"/>
-          <p:cNvSpPr/>
+          <p:cNvPr id="105" name="TextShape 2"/>
+          <p:cNvSpPr txBox="1"/>
           <p:nvPr/>
         </p:nvSpPr>
         <p:spPr>
           <a:xfrm>
             <a:off x="11245680" y="100080"/>
-            <a:ext cx="814320" cy="1123920"/>
+            <a:ext cx="814680" cy="1124280"/>
           </a:xfrm>
           <a:prstGeom prst="rect">
             <a:avLst/>
@@ -4332,40 +4962,22 @@
             <a:noFill/>
           </a:ln>
         </p:spPr>
-        <p:style>
-          <a:lnRef idx="0"/>
-          <a:fillRef idx="0"/>
-          <a:effectRef idx="0"/>
-          <a:fontRef idx="minor"/>
-        </p:style>
         <p:txBody>
           <a:bodyPr lIns="90000" rIns="90000" tIns="45000" bIns="45000" anchor="ctr"/>
           <a:p>
-            <a:pPr algn="ctr">
-              <a:lnSpc>
-                <a:spcPct val="100000"/>
-              </a:lnSpc>
-            </a:pPr>
+            <a:pPr algn="ctr"/>
             <a:endParaRPr b="0" lang="pt-PT" sz="1800" spc="-1" strike="noStrike">
               <a:latin typeface="DejaVu Sans"/>
             </a:endParaRPr>
           </a:p>
           <a:p>
-            <a:pPr algn="ctr">
-              <a:lnSpc>
-                <a:spcPct val="100000"/>
-              </a:lnSpc>
-            </a:pPr>
+            <a:pPr algn="ctr"/>
             <a:endParaRPr b="0" lang="pt-PT" sz="1800" spc="-1" strike="noStrike">
               <a:latin typeface="DejaVu Sans"/>
             </a:endParaRPr>
           </a:p>
           <a:p>
-            <a:pPr algn="ctr">
-              <a:lnSpc>
-                <a:spcPct val="100000"/>
-              </a:lnSpc>
-            </a:pPr>
+            <a:pPr algn="ctr"/>
             <a:endParaRPr b="0" lang="pt-PT" sz="1800" spc="-1" strike="noStrike">
               <a:latin typeface="DejaVu Sans"/>
             </a:endParaRPr>
@@ -4433,14 +5045,14 @@
       </p:grpSpPr>
       <p:sp>
         <p:nvSpPr>
-          <p:cNvPr id="101" name="CustomShape 1"/>
+          <p:cNvPr id="106" name="CustomShape 1"/>
           <p:cNvSpPr/>
           <p:nvPr/>
         </p:nvSpPr>
         <p:spPr>
           <a:xfrm>
             <a:off x="274320" y="1554480"/>
-            <a:ext cx="11612160" cy="566640"/>
+            <a:ext cx="11612520" cy="567000"/>
           </a:xfrm>
           <a:prstGeom prst="rect">
             <a:avLst/>
@@ -4465,7 +5077,7 @@
               </a:lnSpc>
             </a:pPr>
             <a:r>
-              <a:rPr b="1" lang="pt-PT" sz="3200" spc="-1" strike="noStrike">
+              <a:rPr b="1" lang="en-US" sz="3200" spc="-1" strike="noStrike">
                 <a:solidFill>
                   <a:srgbClr val="000000"/>
                 </a:solidFill>
@@ -4482,7 +5094,7 @@
       </p:sp>
       <p:pic>
         <p:nvPicPr>
-          <p:cNvPr id="102" name="" descr=""/>
+          <p:cNvPr id="107" name="" descr=""/>
           <p:cNvPicPr/>
           <p:nvPr/>
         </p:nvPicPr>
@@ -4493,7 +5105,7 @@
         <p:spPr>
           <a:xfrm>
             <a:off x="11245680" y="100080"/>
-            <a:ext cx="814320" cy="1123920"/>
+            <a:ext cx="814680" cy="1124280"/>
           </a:xfrm>
           <a:prstGeom prst="rect">
             <a:avLst/>
@@ -4564,14 +5176,14 @@
       </p:grpSpPr>
       <p:sp>
         <p:nvSpPr>
-          <p:cNvPr id="79" name="CustomShape 1"/>
+          <p:cNvPr id="84" name="CustomShape 1"/>
           <p:cNvSpPr/>
           <p:nvPr/>
         </p:nvSpPr>
         <p:spPr>
           <a:xfrm>
             <a:off x="182880" y="182880"/>
-            <a:ext cx="11795040" cy="5810400"/>
+            <a:ext cx="11795400" cy="5810760"/>
           </a:xfrm>
           <a:prstGeom prst="rect">
             <a:avLst/>
@@ -4596,7 +5208,7 @@
               </a:lnSpc>
             </a:pPr>
             <a:r>
-              <a:rPr b="1" lang="pt-PT" sz="2400" spc="-1" strike="noStrike">
+              <a:rPr b="1" lang="en-US" sz="2400" spc="-1" strike="noStrike">
                 <a:solidFill>
                   <a:srgbClr val="000000"/>
                 </a:solidFill>
@@ -4791,14 +5403,14 @@
             </a:endParaRPr>
           </a:p>
           <a:p>
-            <a:pPr marL="457200" indent="-342360">
+            <a:pPr marL="457200" indent="-342720">
               <a:lnSpc>
                 <a:spcPct val="100000"/>
               </a:lnSpc>
               <a:buClr>
                 <a:srgbClr val="000000"/>
               </a:buClr>
-              <a:buFont typeface="Symbol"/>
+              <a:buFont typeface="Symbol" charset="2"/>
               <a:buChar char=""/>
             </a:pPr>
             <a:r>
@@ -4809,21 +5421,21 @@
                 <a:latin typeface="Verdana"/>
                 <a:ea typeface="Verdana"/>
               </a:rPr>
-              <a:t>This workshop will be done in a single sessions 2h long, on 24th October 2017, at 19h00.</a:t>
-            </a:r>
-            <a:endParaRPr b="0" lang="pt-PT" sz="1600" spc="-1" strike="noStrike">
-              <a:latin typeface="DejaVu Sans"/>
-            </a:endParaRPr>
-          </a:p>
-          <a:p>
-            <a:pPr marL="457200" indent="-342360">
+              <a:t>This workshop will be done in a single session 2h long, on 24th October 2017, at 19h00.</a:t>
+            </a:r>
+            <a:endParaRPr b="0" lang="pt-PT" sz="1600" spc="-1" strike="noStrike">
+              <a:latin typeface="DejaVu Sans"/>
+            </a:endParaRPr>
+          </a:p>
+          <a:p>
+            <a:pPr marL="457200" indent="-342720">
               <a:lnSpc>
                 <a:spcPct val="100000"/>
               </a:lnSpc>
               <a:buClr>
                 <a:srgbClr val="000000"/>
               </a:buClr>
-              <a:buFont typeface="Symbol"/>
+              <a:buFont typeface="Symbol" charset="2"/>
               <a:buChar char=""/>
             </a:pPr>
             <a:r>
@@ -4841,14 +5453,14 @@
             </a:endParaRPr>
           </a:p>
           <a:p>
-            <a:pPr lvl="1" marL="432000" indent="-215640">
+            <a:pPr lvl="1" marL="432000" indent="-216000">
               <a:lnSpc>
                 <a:spcPct val="100000"/>
               </a:lnSpc>
               <a:buClr>
                 <a:srgbClr val="000000"/>
               </a:buClr>
-              <a:buFont typeface="Symbol"/>
+              <a:buFont typeface="Symbol" charset="2"/>
               <a:buChar char=""/>
             </a:pPr>
             <a:r>
@@ -4872,11 +5484,10 @@
               <a:t>: </a:t>
             </a:r>
             <a:r>
-              <a:rPr b="0" lang="pt-PT" sz="1400" spc="-1" strike="noStrike" u="sng">
-                <a:solidFill>
-                  <a:srgbClr val="0000ff"/>
-                </a:solidFill>
-                <a:uFillTx/>
+              <a:rPr b="0" lang="pt-PT" sz="1400" spc="-1" strike="noStrike">
+                <a:solidFill>
+                  <a:srgbClr val="000000"/>
+                </a:solidFill>
                 <a:latin typeface="Verdana"/>
                 <a:ea typeface="Verdana"/>
                 <a:hlinkClick r:id="rId2"/>
@@ -4888,14 +5499,14 @@
             </a:endParaRPr>
           </a:p>
           <a:p>
-            <a:pPr lvl="1" marL="432000" indent="-215640">
+            <a:pPr lvl="1" marL="432000" indent="-216000">
               <a:lnSpc>
                 <a:spcPct val="100000"/>
               </a:lnSpc>
               <a:buClr>
                 <a:srgbClr val="000000"/>
               </a:buClr>
-              <a:buFont typeface="Symbol"/>
+              <a:buFont typeface="Symbol" charset="2"/>
               <a:buChar char=""/>
             </a:pPr>
             <a:r>
@@ -4919,11 +5530,10 @@
               <a:t>: </a:t>
             </a:r>
             <a:r>
-              <a:rPr b="0" lang="pt-PT" sz="1400" spc="-1" strike="noStrike" u="sng">
-                <a:solidFill>
-                  <a:srgbClr val="0000ff"/>
-                </a:solidFill>
-                <a:uFillTx/>
+              <a:rPr b="0" lang="pt-PT" sz="1400" spc="-1" strike="noStrike">
+                <a:solidFill>
+                  <a:srgbClr val="000000"/>
+                </a:solidFill>
                 <a:latin typeface="Verdana"/>
                 <a:ea typeface="Verdana"/>
                 <a:hlinkClick r:id="rId3"/>
@@ -4935,14 +5545,14 @@
             </a:endParaRPr>
           </a:p>
           <a:p>
-            <a:pPr lvl="1" marL="432000" indent="-215640">
+            <a:pPr lvl="1" marL="432000" indent="-216000">
               <a:lnSpc>
                 <a:spcPct val="100000"/>
               </a:lnSpc>
               <a:buClr>
                 <a:srgbClr val="000000"/>
               </a:buClr>
-              <a:buFont typeface="Symbol"/>
+              <a:buFont typeface="Symbol" charset="2"/>
               <a:buChar char=""/>
             </a:pPr>
             <a:r>
@@ -4966,11 +5576,10 @@
               <a:t>: </a:t>
             </a:r>
             <a:r>
-              <a:rPr b="0" lang="pt-PT" sz="1400" spc="-1" strike="noStrike" u="sng">
-                <a:solidFill>
-                  <a:srgbClr val="0000ff"/>
-                </a:solidFill>
-                <a:uFillTx/>
+              <a:rPr b="0" lang="pt-PT" sz="1400" spc="-1" strike="noStrike">
+                <a:solidFill>
+                  <a:srgbClr val="000000"/>
+                </a:solidFill>
                 <a:latin typeface="Verdana"/>
                 <a:ea typeface="Verdana"/>
                 <a:hlinkClick r:id="rId4"/>
@@ -4992,10 +5601,15 @@
             </a:endParaRPr>
           </a:p>
           <a:p>
-            <a:pPr>
-              <a:lnSpc>
-                <a:spcPct val="100000"/>
-              </a:lnSpc>
+            <a:pPr marL="457200" indent="-342720">
+              <a:lnSpc>
+                <a:spcPct val="100000"/>
+              </a:lnSpc>
+              <a:buClr>
+                <a:srgbClr val="000000"/>
+              </a:buClr>
+              <a:buFont typeface="Symbol" charset="2"/>
+              <a:buChar char=""/>
             </a:pPr>
             <a:endParaRPr b="0" lang="pt-PT" sz="1400" spc="-1" strike="noStrike">
               <a:latin typeface="DejaVu Sans"/>
@@ -5105,7 +5719,7 @@
       </p:sp>
       <p:pic>
         <p:nvPicPr>
-          <p:cNvPr id="80" name="" descr=""/>
+          <p:cNvPr id="85" name="" descr=""/>
           <p:cNvPicPr/>
           <p:nvPr/>
         </p:nvPicPr>
@@ -5116,7 +5730,7 @@
         <p:spPr>
           <a:xfrm>
             <a:off x="11245680" y="100080"/>
-            <a:ext cx="814320" cy="1123920"/>
+            <a:ext cx="814680" cy="1124280"/>
           </a:xfrm>
           <a:prstGeom prst="rect">
             <a:avLst/>
@@ -5187,14 +5801,14 @@
       </p:grpSpPr>
       <p:sp>
         <p:nvSpPr>
-          <p:cNvPr id="81" name="CustomShape 1"/>
+          <p:cNvPr id="86" name="CustomShape 1"/>
           <p:cNvSpPr/>
           <p:nvPr/>
         </p:nvSpPr>
         <p:spPr>
           <a:xfrm>
             <a:off x="182880" y="182880"/>
-            <a:ext cx="11795040" cy="5810400"/>
+            <a:ext cx="11795400" cy="5810760"/>
           </a:xfrm>
           <a:prstGeom prst="rect">
             <a:avLst/>
@@ -5219,7 +5833,7 @@
               </a:lnSpc>
             </a:pPr>
             <a:r>
-              <a:rPr b="1" lang="pt-PT" sz="2400" spc="-1" strike="noStrike">
+              <a:rPr b="1" lang="en-US" sz="2400" spc="-1" strike="noStrike">
                 <a:solidFill>
                   <a:srgbClr val="000000"/>
                 </a:solidFill>
@@ -5249,7 +5863,7 @@
               </a:lnSpc>
             </a:pPr>
             <a:r>
-              <a:rPr b="1" lang="pt-PT" sz="1800" spc="-1" strike="noStrike">
+              <a:rPr b="1" lang="en-US" sz="1800" spc="-1" strike="noStrike">
                 <a:solidFill>
                   <a:srgbClr val="000000"/>
                 </a:solidFill>
@@ -5263,7 +5877,7 @@
             </a:endParaRPr>
           </a:p>
           <a:p>
-            <a:pPr lvl="1" marL="432000" indent="-215280">
+            <a:pPr lvl="1" marL="432000" indent="-215640">
               <a:lnSpc>
                 <a:spcPct val="100000"/>
               </a:lnSpc>
@@ -5275,7 +5889,7 @@
               <a:buChar char="●"/>
             </a:pPr>
             <a:r>
-              <a:rPr b="0" lang="pt-PT" sz="1600" spc="-1" strike="noStrike">
+              <a:rPr b="0" lang="en-US" sz="1600" spc="-1" strike="noStrike">
                 <a:solidFill>
                   <a:srgbClr val="000000"/>
                 </a:solidFill>
@@ -5289,7 +5903,7 @@
             </a:endParaRPr>
           </a:p>
           <a:p>
-            <a:pPr lvl="1" marL="432000" indent="-215280">
+            <a:pPr lvl="1" marL="432000" indent="-215640">
               <a:lnSpc>
                 <a:spcPct val="100000"/>
               </a:lnSpc>
@@ -5301,7 +5915,7 @@
               <a:buChar char="●"/>
             </a:pPr>
             <a:r>
-              <a:rPr b="0" lang="pt-PT" sz="1600" spc="-1" strike="noStrike">
+              <a:rPr b="0" lang="en-US" sz="1600" spc="-1" strike="noStrike">
                 <a:solidFill>
                   <a:srgbClr val="000000"/>
                 </a:solidFill>
@@ -5315,7 +5929,7 @@
             </a:endParaRPr>
           </a:p>
           <a:p>
-            <a:pPr lvl="1" marL="432000" indent="-215280">
+            <a:pPr lvl="1" marL="432000" indent="-215640">
               <a:lnSpc>
                 <a:spcPct val="100000"/>
               </a:lnSpc>
@@ -5327,7 +5941,7 @@
               <a:buChar char="●"/>
             </a:pPr>
             <a:r>
-              <a:rPr b="0" lang="pt-PT" sz="1600" spc="-1" strike="noStrike">
+              <a:rPr b="0" lang="en-US" sz="1600" spc="-1" strike="noStrike">
                 <a:solidFill>
                   <a:srgbClr val="000000"/>
                 </a:solidFill>
@@ -5341,7 +5955,7 @@
             </a:endParaRPr>
           </a:p>
           <a:p>
-            <a:pPr lvl="1" marL="432000" indent="-215280">
+            <a:pPr lvl="1" marL="432000" indent="-215640">
               <a:lnSpc>
                 <a:spcPct val="100000"/>
               </a:lnSpc>
@@ -5353,7 +5967,7 @@
               <a:buChar char="●"/>
             </a:pPr>
             <a:r>
-              <a:rPr b="0" lang="pt-PT" sz="1600" spc="-1" strike="noStrike">
+              <a:rPr b="0" lang="en-US" sz="1600" spc="-1" strike="noStrike">
                 <a:solidFill>
                   <a:srgbClr val="000000"/>
                 </a:solidFill>
@@ -5367,7 +5981,7 @@
             </a:endParaRPr>
           </a:p>
           <a:p>
-            <a:pPr lvl="1" marL="432000" indent="-215280">
+            <a:pPr lvl="1" marL="432000" indent="-215640">
               <a:lnSpc>
                 <a:spcPct val="100000"/>
               </a:lnSpc>
@@ -5379,7 +5993,7 @@
               <a:buChar char="●"/>
             </a:pPr>
             <a:r>
-              <a:rPr b="0" lang="pt-PT" sz="1600" spc="-1" strike="noStrike">
+              <a:rPr b="0" lang="en-US" sz="1600" spc="-1" strike="noStrike">
                 <a:solidFill>
                   <a:srgbClr val="000000"/>
                 </a:solidFill>
@@ -5393,7 +6007,7 @@
             </a:endParaRPr>
           </a:p>
           <a:p>
-            <a:pPr lvl="1" marL="432000" indent="-215280">
+            <a:pPr lvl="1" marL="432000" indent="-215640">
               <a:lnSpc>
                 <a:spcPct val="100000"/>
               </a:lnSpc>
@@ -5405,7 +6019,7 @@
               <a:buChar char="●"/>
             </a:pPr>
             <a:r>
-              <a:rPr b="0" lang="pt-PT" sz="1600" spc="-1" strike="noStrike">
+              <a:rPr b="0" lang="en-US" sz="1600" spc="-1" strike="noStrike">
                 <a:solidFill>
                   <a:srgbClr val="000000"/>
                 </a:solidFill>
@@ -5435,7 +6049,7 @@
               </a:lnSpc>
             </a:pPr>
             <a:r>
-              <a:rPr b="1" lang="pt-PT" sz="1800" spc="-1" strike="noStrike">
+              <a:rPr b="1" lang="en-US" sz="1800" spc="-1" strike="noStrike">
                 <a:solidFill>
                   <a:srgbClr val="000000"/>
                 </a:solidFill>
@@ -5449,7 +6063,7 @@
             </a:endParaRPr>
           </a:p>
           <a:p>
-            <a:pPr lvl="1" marL="432000" indent="-215280">
+            <a:pPr lvl="1" marL="432000" indent="-215640">
               <a:lnSpc>
                 <a:spcPct val="100000"/>
               </a:lnSpc>
@@ -5461,7 +6075,7 @@
               <a:buChar char="●"/>
             </a:pPr>
             <a:r>
-              <a:rPr b="0" lang="pt-PT" sz="1600" spc="-1" strike="noStrike">
+              <a:rPr b="0" lang="en-US" sz="1600" spc="-1" strike="noStrike">
                 <a:solidFill>
                   <a:srgbClr val="000000"/>
                 </a:solidFill>
@@ -5475,7 +6089,7 @@
             </a:endParaRPr>
           </a:p>
           <a:p>
-            <a:pPr lvl="1" marL="432000" indent="-215280">
+            <a:pPr lvl="1" marL="432000" indent="-215640">
               <a:lnSpc>
                 <a:spcPct val="100000"/>
               </a:lnSpc>
@@ -5487,7 +6101,7 @@
               <a:buChar char="●"/>
             </a:pPr>
             <a:r>
-              <a:rPr b="0" lang="pt-PT" sz="1600" spc="-1" strike="noStrike">
+              <a:rPr b="0" lang="en-US" sz="1600" spc="-1" strike="noStrike">
                 <a:solidFill>
                   <a:srgbClr val="000000"/>
                 </a:solidFill>
@@ -5498,12 +6112,11 @@
             </a:r>
             <a:br/>
             <a:r>
-              <a:rPr b="0" lang="pt-PT" sz="1800" spc="-1" strike="noStrike">
-                <a:solidFill>
-                  <a:srgbClr val="000000"/>
-                </a:solidFill>
-                <a:latin typeface="Verdana"/>
-                <a:ea typeface="DejaVu Sans"/>
+              <a:rPr b="0" lang="en-US" sz="1800" spc="-1" strike="noStrike">
+                <a:solidFill>
+                  <a:srgbClr val="000000"/>
+                </a:solidFill>
+                <a:latin typeface="Verdana"/>
               </a:rPr>
               <a:t> </a:t>
             </a:r>
@@ -5518,7 +6131,7 @@
               </a:lnSpc>
             </a:pPr>
             <a:r>
-              <a:rPr b="1" lang="pt-PT" sz="1800" spc="-1" strike="noStrike">
+              <a:rPr b="1" lang="en-US" sz="1800" spc="-1" strike="noStrike">
                 <a:solidFill>
                   <a:srgbClr val="000000"/>
                 </a:solidFill>
@@ -5532,7 +6145,7 @@
             </a:endParaRPr>
           </a:p>
           <a:p>
-            <a:pPr lvl="1" marL="432000" indent="-215280">
+            <a:pPr lvl="1" marL="432000" indent="-215640">
               <a:lnSpc>
                 <a:spcPct val="100000"/>
               </a:lnSpc>
@@ -5544,7 +6157,7 @@
               <a:buChar char="●"/>
             </a:pPr>
             <a:r>
-              <a:rPr b="0" lang="pt-PT" sz="1600" spc="-1" strike="noStrike">
+              <a:rPr b="0" lang="en-US" sz="1600" spc="-1" strike="noStrike">
                 <a:solidFill>
                   <a:srgbClr val="000000"/>
                 </a:solidFill>
@@ -5558,7 +6171,7 @@
             </a:endParaRPr>
           </a:p>
           <a:p>
-            <a:pPr lvl="1" marL="432000" indent="-215280">
+            <a:pPr lvl="1" marL="432000" indent="-215640">
               <a:lnSpc>
                 <a:spcPct val="100000"/>
               </a:lnSpc>
@@ -5570,21 +6183,21 @@
               <a:buChar char="●"/>
             </a:pPr>
             <a:r>
-              <a:rPr b="0" lang="pt-PT" sz="1600" spc="-1" strike="noStrike">
-                <a:solidFill>
-                  <a:srgbClr val="000000"/>
-                </a:solidFill>
-                <a:latin typeface="Verdana"/>
-                <a:ea typeface="Verdana"/>
-              </a:rPr>
-              <a:t>Import code from Git</a:t>
-            </a:r>
-            <a:endParaRPr b="0" lang="pt-PT" sz="1600" spc="-1" strike="noStrike">
-              <a:latin typeface="DejaVu Sans"/>
-            </a:endParaRPr>
-          </a:p>
-          <a:p>
-            <a:pPr lvl="1" marL="432000" indent="-215280">
+              <a:rPr b="0" lang="en-US" sz="1600" spc="-1" strike="noStrike">
+                <a:solidFill>
+                  <a:srgbClr val="000000"/>
+                </a:solidFill>
+                <a:latin typeface="Verdana"/>
+                <a:ea typeface="Verdana"/>
+              </a:rPr>
+              <a:t>Import code from a GitHub repository</a:t>
+            </a:r>
+            <a:endParaRPr b="0" lang="pt-PT" sz="1600" spc="-1" strike="noStrike">
+              <a:latin typeface="DejaVu Sans"/>
+            </a:endParaRPr>
+          </a:p>
+          <a:p>
+            <a:pPr lvl="1" marL="432000" indent="-215640">
               <a:lnSpc>
                 <a:spcPct val="100000"/>
               </a:lnSpc>
@@ -5596,7 +6209,7 @@
               <a:buChar char="●"/>
             </a:pPr>
             <a:r>
-              <a:rPr b="0" lang="pt-PT" sz="1600" spc="-1" strike="noStrike">
+              <a:rPr b="0" lang="en-US" sz="1600" spc="-1" strike="noStrike">
                 <a:solidFill>
                   <a:srgbClr val="000000"/>
                 </a:solidFill>
@@ -5610,7 +6223,7 @@
             </a:endParaRPr>
           </a:p>
           <a:p>
-            <a:pPr lvl="1" marL="432000" indent="-215280">
+            <a:pPr lvl="1" marL="432000" indent="-215640">
               <a:lnSpc>
                 <a:spcPct val="100000"/>
               </a:lnSpc>
@@ -5622,33 +6235,7 @@
               <a:buChar char="●"/>
             </a:pPr>
             <a:r>
-              <a:rPr b="0" lang="pt-PT" sz="1600" spc="-1" strike="noStrike">
-                <a:solidFill>
-                  <a:srgbClr val="000000"/>
-                </a:solidFill>
-                <a:latin typeface="Verdana"/>
-                <a:ea typeface="Verdana"/>
-              </a:rPr>
-              <a:t>Docker usage example: Build Docker Image, Deploy to Container</a:t>
-            </a:r>
-            <a:endParaRPr b="0" lang="pt-PT" sz="1600" spc="-1" strike="noStrike">
-              <a:latin typeface="DejaVu Sans"/>
-            </a:endParaRPr>
-          </a:p>
-          <a:p>
-            <a:pPr lvl="1" marL="432000" indent="-215280">
-              <a:lnSpc>
-                <a:spcPct val="100000"/>
-              </a:lnSpc>
-              <a:buClr>
-                <a:srgbClr val="000000"/>
-              </a:buClr>
-              <a:buSzPct val="45000"/>
-              <a:buFont typeface="Noto Sans Symbols"/>
-              <a:buChar char="●"/>
-            </a:pPr>
-            <a:r>
-              <a:rPr b="0" lang="pt-PT" sz="1600" spc="-1" strike="noStrike">
+              <a:rPr b="0" lang="en-US" sz="1600" spc="-1" strike="noStrike">
                 <a:solidFill>
                   <a:srgbClr val="000000"/>
                 </a:solidFill>
@@ -5665,7 +6252,7 @@
       </p:sp>
       <p:pic>
         <p:nvPicPr>
-          <p:cNvPr id="82" name="" descr=""/>
+          <p:cNvPr id="87" name="" descr=""/>
           <p:cNvPicPr/>
           <p:nvPr/>
         </p:nvPicPr>
@@ -5676,7 +6263,7 @@
         <p:spPr>
           <a:xfrm>
             <a:off x="11245680" y="100080"/>
-            <a:ext cx="814320" cy="1123920"/>
+            <a:ext cx="814680" cy="1124280"/>
           </a:xfrm>
           <a:prstGeom prst="rect">
             <a:avLst/>
@@ -5747,14 +6334,14 @@
       </p:grpSpPr>
       <p:sp>
         <p:nvSpPr>
-          <p:cNvPr id="83" name="CustomShape 1"/>
+          <p:cNvPr id="88" name="CustomShape 1"/>
           <p:cNvSpPr/>
           <p:nvPr/>
         </p:nvSpPr>
         <p:spPr>
           <a:xfrm>
             <a:off x="182880" y="182880"/>
-            <a:ext cx="11795040" cy="3097800"/>
+            <a:ext cx="11795400" cy="3098160"/>
           </a:xfrm>
           <a:prstGeom prst="rect">
             <a:avLst/>
@@ -5779,7 +6366,7 @@
               </a:lnSpc>
             </a:pPr>
             <a:r>
-              <a:rPr b="1" lang="pt-PT" sz="2400" spc="-1" strike="noStrike">
+              <a:rPr b="1" lang="en-US" sz="2400" spc="-1" strike="noStrike">
                 <a:solidFill>
                   <a:srgbClr val="000000"/>
                 </a:solidFill>
@@ -5809,7 +6396,7 @@
               </a:lnSpc>
             </a:pPr>
             <a:r>
-              <a:rPr b="0" lang="pt-PT" sz="1600" spc="-1" strike="noStrike">
+              <a:rPr b="0" lang="en-US" sz="1600" spc="-1" strike="noStrike">
                 <a:solidFill>
                   <a:srgbClr val="000000"/>
                 </a:solidFill>
@@ -5829,7 +6416,7 @@
               </a:lnSpc>
             </a:pPr>
             <a:r>
-              <a:rPr b="0" lang="pt-PT" sz="1600" spc="-1" strike="noStrike">
+              <a:rPr b="0" lang="en-US" sz="1600" spc="-1" strike="noStrike">
                 <a:solidFill>
                   <a:srgbClr val="000000"/>
                 </a:solidFill>
@@ -5849,7 +6436,7 @@
               </a:lnSpc>
             </a:pPr>
             <a:r>
-              <a:rPr b="0" lang="pt-PT" sz="1600" spc="-1" strike="noStrike">
+              <a:rPr b="0" lang="en-US" sz="1600" spc="-1" strike="noStrike">
                 <a:solidFill>
                   <a:srgbClr val="000000"/>
                 </a:solidFill>
@@ -5879,7 +6466,7 @@
               </a:lnSpc>
             </a:pPr>
             <a:r>
-              <a:rPr b="0" lang="pt-PT" sz="1600" spc="-1" strike="noStrike">
+              <a:rPr b="0" lang="en-US" sz="1600" spc="-1" strike="noStrike">
                 <a:solidFill>
                   <a:srgbClr val="000000"/>
                 </a:solidFill>
@@ -5956,7 +6543,7 @@
       </p:sp>
       <p:pic>
         <p:nvPicPr>
-          <p:cNvPr id="84" name="" descr=""/>
+          <p:cNvPr id="89" name="" descr=""/>
           <p:cNvPicPr/>
           <p:nvPr/>
         </p:nvPicPr>
@@ -5967,7 +6554,7 @@
         <p:spPr>
           <a:xfrm>
             <a:off x="2376000" y="2363760"/>
-            <a:ext cx="7439760" cy="4146480"/>
+            <a:ext cx="7440120" cy="4146840"/>
           </a:xfrm>
           <a:prstGeom prst="rect">
             <a:avLst/>
@@ -5979,7 +6566,7 @@
       </p:pic>
       <p:pic>
         <p:nvPicPr>
-          <p:cNvPr id="85" name="" descr=""/>
+          <p:cNvPr id="90" name="" descr=""/>
           <p:cNvPicPr/>
           <p:nvPr/>
         </p:nvPicPr>
@@ -5990,7 +6577,7 @@
         <p:spPr>
           <a:xfrm>
             <a:off x="11245680" y="100080"/>
-            <a:ext cx="814320" cy="1123920"/>
+            <a:ext cx="814680" cy="1124280"/>
           </a:xfrm>
           <a:prstGeom prst="rect">
             <a:avLst/>
@@ -6061,14 +6648,14 @@
       </p:grpSpPr>
       <p:sp>
         <p:nvSpPr>
-          <p:cNvPr id="86" name="CustomShape 1"/>
+          <p:cNvPr id="91" name="CustomShape 1"/>
           <p:cNvSpPr/>
           <p:nvPr/>
         </p:nvSpPr>
         <p:spPr>
           <a:xfrm>
             <a:off x="182880" y="182880"/>
-            <a:ext cx="11840760" cy="6308640"/>
+            <a:ext cx="11841120" cy="6309000"/>
           </a:xfrm>
           <a:prstGeom prst="rect">
             <a:avLst/>
@@ -6093,7 +6680,7 @@
               </a:lnSpc>
             </a:pPr>
             <a:r>
-              <a:rPr b="1" lang="pt-PT" sz="2400" spc="-1" strike="noStrike">
+              <a:rPr b="1" lang="en-US" sz="2400" spc="-1" strike="noStrike">
                 <a:solidFill>
                   <a:srgbClr val="000000"/>
                 </a:solidFill>
@@ -6133,7 +6720,7 @@
               </a:lnSpc>
             </a:pPr>
             <a:r>
-              <a:rPr b="1" lang="pt-PT" sz="1800" spc="-1" strike="noStrike">
+              <a:rPr b="1" lang="en-US" sz="1800" spc="-1" strike="noStrike">
                 <a:solidFill>
                   <a:srgbClr val="000000"/>
                 </a:solidFill>
@@ -6147,7 +6734,7 @@
             </a:endParaRPr>
           </a:p>
           <a:p>
-            <a:pPr marL="216000" indent="-215640">
+            <a:pPr marL="216000" indent="-216000">
               <a:lnSpc>
                 <a:spcPct val="100000"/>
               </a:lnSpc>
@@ -6159,7 +6746,7 @@
               <a:buChar char=""/>
             </a:pPr>
             <a:r>
-              <a:rPr b="0" lang="pt-PT" sz="1600" spc="-1" strike="noStrike">
+              <a:rPr b="0" lang="en-US" sz="1600" spc="-1" strike="noStrike">
                 <a:solidFill>
                   <a:srgbClr val="000000"/>
                 </a:solidFill>
@@ -6173,7 +6760,7 @@
             </a:endParaRPr>
           </a:p>
           <a:p>
-            <a:pPr marL="216000" indent="-215640">
+            <a:pPr marL="216000" indent="-216000">
               <a:lnSpc>
                 <a:spcPct val="100000"/>
               </a:lnSpc>
@@ -6185,7 +6772,7 @@
               <a:buChar char=""/>
             </a:pPr>
             <a:r>
-              <a:rPr b="0" lang="pt-PT" sz="1600" spc="-1" strike="noStrike">
+              <a:rPr b="0" lang="en-US" sz="1600" spc="-1" strike="noStrike">
                 <a:solidFill>
                   <a:srgbClr val="000000"/>
                 </a:solidFill>
@@ -6199,7 +6786,7 @@
             </a:endParaRPr>
           </a:p>
           <a:p>
-            <a:pPr marL="216000" indent="-215640">
+            <a:pPr marL="216000" indent="-216000">
               <a:lnSpc>
                 <a:spcPct val="100000"/>
               </a:lnSpc>
@@ -6211,7 +6798,7 @@
               <a:buChar char=""/>
             </a:pPr>
             <a:r>
-              <a:rPr b="0" lang="pt-PT" sz="1600" spc="-1" strike="noStrike">
+              <a:rPr b="0" lang="en-US" sz="1600" spc="-1" strike="noStrike">
                 <a:solidFill>
                   <a:srgbClr val="000000"/>
                 </a:solidFill>
@@ -6225,7 +6812,7 @@
             </a:endParaRPr>
           </a:p>
           <a:p>
-            <a:pPr marL="216000" indent="-215640">
+            <a:pPr marL="216000" indent="-216000">
               <a:lnSpc>
                 <a:spcPct val="100000"/>
               </a:lnSpc>
@@ -6237,7 +6824,7 @@
               <a:buChar char=""/>
             </a:pPr>
             <a:r>
-              <a:rPr b="0" lang="pt-PT" sz="1600" spc="-1" strike="noStrike">
+              <a:rPr b="0" lang="en-US" sz="1600" spc="-1" strike="noStrike">
                 <a:solidFill>
                   <a:srgbClr val="000000"/>
                 </a:solidFill>
@@ -6251,7 +6838,7 @@
             </a:endParaRPr>
           </a:p>
           <a:p>
-            <a:pPr marL="216000" indent="-215640">
+            <a:pPr marL="216000" indent="-216000">
               <a:lnSpc>
                 <a:spcPct val="100000"/>
               </a:lnSpc>
@@ -6263,7 +6850,7 @@
               <a:buChar char=""/>
             </a:pPr>
             <a:r>
-              <a:rPr b="0" lang="pt-PT" sz="1600" spc="-1" strike="noStrike">
+              <a:rPr b="0" lang="en-US" sz="1600" spc="-1" strike="noStrike">
                 <a:solidFill>
                   <a:srgbClr val="000000"/>
                 </a:solidFill>
@@ -6277,7 +6864,7 @@
             </a:endParaRPr>
           </a:p>
           <a:p>
-            <a:pPr marL="216000" indent="-215640">
+            <a:pPr marL="216000" indent="-216000">
               <a:lnSpc>
                 <a:spcPct val="100000"/>
               </a:lnSpc>
@@ -6289,7 +6876,7 @@
               <a:buChar char=""/>
             </a:pPr>
             <a:r>
-              <a:rPr b="0" lang="pt-PT" sz="1600" spc="-1" strike="noStrike">
+              <a:rPr b="0" lang="en-US" sz="1600" spc="-1" strike="noStrike">
                 <a:solidFill>
                   <a:srgbClr val="000000"/>
                 </a:solidFill>
@@ -6303,7 +6890,7 @@
             </a:endParaRPr>
           </a:p>
           <a:p>
-            <a:pPr marL="216000" indent="-215640">
+            <a:pPr marL="216000" indent="-216000">
               <a:lnSpc>
                 <a:spcPct val="100000"/>
               </a:lnSpc>
@@ -6315,7 +6902,7 @@
               <a:buChar char=""/>
             </a:pPr>
             <a:r>
-              <a:rPr b="0" lang="pt-PT" sz="1600" spc="-1" strike="noStrike">
+              <a:rPr b="0" lang="en-US" sz="1600" spc="-1" strike="noStrike">
                 <a:solidFill>
                   <a:srgbClr val="000000"/>
                 </a:solidFill>
@@ -6329,23 +6916,29 @@
             </a:endParaRPr>
           </a:p>
           <a:p>
-            <a:pPr>
-              <a:lnSpc>
-                <a:spcPct val="100000"/>
-              </a:lnSpc>
-            </a:pPr>
-            <a:endParaRPr b="0" lang="pt-PT" sz="1600" spc="-1" strike="noStrike">
-              <a:latin typeface="DejaVu Sans"/>
-            </a:endParaRPr>
-          </a:p>
-          <a:p>
-            <a:pPr>
-              <a:lnSpc>
-                <a:spcPct val="100000"/>
-              </a:lnSpc>
-            </a:pPr>
-            <a:r>
-              <a:rPr b="1" lang="pt-PT" sz="1800" spc="-1" strike="noStrike">
+            <a:pPr marL="216000" indent="-216000">
+              <a:lnSpc>
+                <a:spcPct val="100000"/>
+              </a:lnSpc>
+              <a:buClr>
+                <a:srgbClr val="000000"/>
+              </a:buClr>
+              <a:buSzPct val="45000"/>
+              <a:buFont typeface="Wingdings" charset="2"/>
+              <a:buChar char=""/>
+            </a:pPr>
+            <a:endParaRPr b="0" lang="pt-PT" sz="1600" spc="-1" strike="noStrike">
+              <a:latin typeface="DejaVu Sans"/>
+            </a:endParaRPr>
+          </a:p>
+          <a:p>
+            <a:pPr>
+              <a:lnSpc>
+                <a:spcPct val="100000"/>
+              </a:lnSpc>
+            </a:pPr>
+            <a:r>
+              <a:rPr b="1" lang="en-US" sz="1800" spc="-1" strike="noStrike">
                 <a:solidFill>
                   <a:srgbClr val="000000"/>
                 </a:solidFill>
@@ -6365,7 +6958,7 @@
               </a:lnSpc>
             </a:pPr>
             <a:r>
-              <a:rPr b="0" lang="pt-PT" sz="1600" spc="-1" strike="noStrike">
+              <a:rPr b="0" lang="en-US" sz="1600" spc="-1" strike="noStrike">
                 <a:solidFill>
                   <a:srgbClr val="000000"/>
                 </a:solidFill>
@@ -6385,7 +6978,7 @@
               </a:lnSpc>
             </a:pPr>
             <a:r>
-              <a:rPr b="0" lang="pt-PT" sz="1600" spc="-1" strike="noStrike">
+              <a:rPr b="0" lang="en-US" sz="1600" spc="-1" strike="noStrike">
                 <a:solidFill>
                   <a:srgbClr val="000000"/>
                 </a:solidFill>
@@ -6395,7 +6988,7 @@
               <a:t>One of the best, which is </a:t>
             </a:r>
             <a:r>
-              <a:rPr b="0" lang="pt-PT" sz="1600" spc="-1" strike="noStrike" u="sng">
+              <a:rPr b="0" lang="en-US" sz="1600" spc="-1" strike="noStrike" u="sng">
                 <a:solidFill>
                   <a:srgbClr val="000000"/>
                 </a:solidFill>
@@ -6406,7 +6999,7 @@
               <a:t>free and OpenSource</a:t>
             </a:r>
             <a:r>
-              <a:rPr b="0" lang="pt-PT" sz="1600" spc="-1" strike="noStrike">
+              <a:rPr b="0" lang="en-US" sz="1600" spc="-1" strike="noStrike">
                 <a:solidFill>
                   <a:srgbClr val="000000"/>
                 </a:solidFill>
@@ -6416,7 +7009,7 @@
               <a:t>, is the one we will talk about: </a:t>
             </a:r>
             <a:r>
-              <a:rPr b="1" lang="pt-PT" sz="1600" spc="-1" strike="noStrike">
+              <a:rPr b="1" lang="en-US" sz="1600" spc="-1" strike="noStrike">
                 <a:solidFill>
                   <a:srgbClr val="000000"/>
                 </a:solidFill>
@@ -6433,7 +7026,7 @@
       </p:sp>
       <p:pic>
         <p:nvPicPr>
-          <p:cNvPr id="87" name="" descr=""/>
+          <p:cNvPr id="92" name="" descr=""/>
           <p:cNvPicPr/>
           <p:nvPr/>
         </p:nvPicPr>
@@ -6444,7 +7037,7 @@
         <p:spPr>
           <a:xfrm>
             <a:off x="11245680" y="100080"/>
-            <a:ext cx="814320" cy="1123920"/>
+            <a:ext cx="814680" cy="1124280"/>
           </a:xfrm>
           <a:prstGeom prst="rect">
             <a:avLst/>
@@ -6515,14 +7108,14 @@
       </p:grpSpPr>
       <p:sp>
         <p:nvSpPr>
-          <p:cNvPr id="88" name="CustomShape 1"/>
+          <p:cNvPr id="93" name="CustomShape 1"/>
           <p:cNvSpPr/>
           <p:nvPr/>
         </p:nvSpPr>
         <p:spPr>
           <a:xfrm>
             <a:off x="182880" y="182880"/>
-            <a:ext cx="11795040" cy="5005800"/>
+            <a:ext cx="11795400" cy="5006160"/>
           </a:xfrm>
           <a:prstGeom prst="rect">
             <a:avLst/>
@@ -6547,7 +7140,7 @@
               </a:lnSpc>
             </a:pPr>
             <a:r>
-              <a:rPr b="1" lang="pt-PT" sz="2400" spc="-1" strike="noStrike">
+              <a:rPr b="1" lang="en-US" sz="2400" spc="-1" strike="noStrike">
                 <a:solidFill>
                   <a:srgbClr val="000000"/>
                 </a:solidFill>
@@ -6577,7 +7170,7 @@
               </a:lnSpc>
             </a:pPr>
             <a:r>
-              <a:rPr b="1" lang="pt-PT" sz="1800" spc="-1" strike="noStrike">
+              <a:rPr b="1" lang="en-US" sz="1800" spc="-1" strike="noStrike">
                 <a:solidFill>
                   <a:srgbClr val="000000"/>
                 </a:solidFill>
@@ -6597,7 +7190,7 @@
               </a:lnSpc>
             </a:pPr>
             <a:r>
-              <a:rPr b="0" lang="pt-PT" sz="1600" spc="-1" strike="noStrike">
+              <a:rPr b="0" lang="en-US" sz="1600" spc="-1" strike="noStrike">
                 <a:solidFill>
                   <a:srgbClr val="000000"/>
                 </a:solidFill>
@@ -6627,7 +7220,7 @@
               </a:lnSpc>
             </a:pPr>
             <a:r>
-              <a:rPr b="1" lang="pt-PT" sz="1800" spc="-1" strike="noStrike">
+              <a:rPr b="1" lang="en-US" sz="1800" spc="-1" strike="noStrike">
                 <a:solidFill>
                   <a:srgbClr val="000000"/>
                 </a:solidFill>
@@ -6647,7 +7240,7 @@
               </a:lnSpc>
             </a:pPr>
             <a:r>
-              <a:rPr b="0" lang="pt-PT" sz="1600" spc="-1" strike="noStrike">
+              <a:rPr b="0" lang="en-US" sz="1600" spc="-1" strike="noStrike">
                 <a:solidFill>
                   <a:srgbClr val="000000"/>
                 </a:solidFill>
@@ -6657,7 +7250,7 @@
               <a:t>Jenkins was first released in Feb 2005, by Sun Microsystems (acquired by Oracle during 2009/2010), as the </a:t>
             </a:r>
             <a:r>
-              <a:rPr b="0" lang="pt-PT" sz="1600" spc="-1" strike="noStrike" u="sng">
+              <a:rPr b="0" lang="en-US" sz="1600" spc="-1" strike="noStrike" u="sng">
                 <a:solidFill>
                   <a:srgbClr val="000000"/>
                 </a:solidFill>
@@ -6668,7 +7261,7 @@
               <a:t>Hudson</a:t>
             </a:r>
             <a:r>
-              <a:rPr b="0" lang="pt-PT" sz="1600" spc="-1" strike="noStrike">
+              <a:rPr b="0" lang="en-US" sz="1600" spc="-1" strike="noStrike">
                 <a:solidFill>
                   <a:srgbClr val="000000"/>
                 </a:solidFill>
@@ -6688,7 +7281,7 @@
               </a:lnSpc>
             </a:pPr>
             <a:r>
-              <a:rPr b="0" lang="pt-PT" sz="1600" spc="-1" strike="noStrike">
+              <a:rPr b="0" lang="en-US" sz="1600" spc="-1" strike="noStrike">
                 <a:solidFill>
                   <a:srgbClr val="000000"/>
                 </a:solidFill>
@@ -6708,7 +7301,7 @@
               </a:lnSpc>
             </a:pPr>
             <a:r>
-              <a:rPr b="0" lang="pt-PT" sz="1600" spc="-1" strike="noStrike">
+              <a:rPr b="0" lang="en-US" sz="1600" spc="-1" strike="noStrike">
                 <a:solidFill>
                   <a:srgbClr val="000000"/>
                 </a:solidFill>
@@ -6738,7 +7331,7 @@
               </a:lnSpc>
             </a:pPr>
             <a:r>
-              <a:rPr b="0" lang="pt-PT" sz="1600" spc="-1" strike="noStrike">
+              <a:rPr b="0" lang="en-US" sz="1600" spc="-1" strike="noStrike">
                 <a:solidFill>
                   <a:srgbClr val="000000"/>
                 </a:solidFill>
@@ -6758,7 +7351,7 @@
               </a:lnSpc>
             </a:pPr>
             <a:r>
-              <a:rPr b="0" lang="pt-PT" sz="1600" spc="-1" strike="noStrike">
+              <a:rPr b="0" lang="en-US" sz="1600" spc="-1" strike="noStrike">
                 <a:solidFill>
                   <a:srgbClr val="000000"/>
                 </a:solidFill>
@@ -6778,7 +7371,7 @@
               </a:lnSpc>
             </a:pPr>
             <a:r>
-              <a:rPr b="0" lang="pt-PT" sz="1600" spc="-1" strike="noStrike">
+              <a:rPr b="0" lang="en-US" sz="1600" spc="-1" strike="noStrike">
                 <a:solidFill>
                   <a:srgbClr val="000000"/>
                 </a:solidFill>
@@ -6808,7 +7401,7 @@
               </a:lnSpc>
             </a:pPr>
             <a:r>
-              <a:rPr b="0" lang="pt-PT" sz="1600" spc="-1" strike="noStrike">
+              <a:rPr b="0" lang="en-US" sz="1600" spc="-1" strike="noStrike">
                 <a:solidFill>
                   <a:srgbClr val="000000"/>
                 </a:solidFill>
@@ -6819,7 +7412,7 @@
             </a:r>
             <a:br/>
             <a:r>
-              <a:rPr b="0" lang="pt-PT" sz="1600" spc="-1" strike="noStrike">
+              <a:rPr b="0" lang="en-US" sz="1600" spc="-1" strike="noStrike">
                 <a:solidFill>
                   <a:srgbClr val="000000"/>
                 </a:solidFill>
@@ -6836,7 +7429,7 @@
       </p:sp>
       <p:pic>
         <p:nvPicPr>
-          <p:cNvPr id="89" name="" descr=""/>
+          <p:cNvPr id="94" name="" descr=""/>
           <p:cNvPicPr/>
           <p:nvPr/>
         </p:nvPicPr>
@@ -6847,7 +7440,7 @@
         <p:spPr>
           <a:xfrm>
             <a:off x="11245320" y="99720"/>
-            <a:ext cx="814320" cy="1123920"/>
+            <a:ext cx="814680" cy="1124280"/>
           </a:xfrm>
           <a:prstGeom prst="rect">
             <a:avLst/>
@@ -6918,14 +7511,14 @@
       </p:grpSpPr>
       <p:sp>
         <p:nvSpPr>
-          <p:cNvPr id="90" name="CustomShape 1"/>
+          <p:cNvPr id="95" name="CustomShape 1"/>
           <p:cNvSpPr/>
           <p:nvPr/>
         </p:nvSpPr>
         <p:spPr>
           <a:xfrm>
             <a:off x="0" y="182880"/>
-            <a:ext cx="180000" cy="446400"/>
+            <a:ext cx="180360" cy="446760"/>
           </a:xfrm>
           <a:prstGeom prst="rect">
             <a:avLst/>
@@ -6944,14 +7537,14 @@
       </p:sp>
       <p:sp>
         <p:nvSpPr>
-          <p:cNvPr id="91" name="CustomShape 2"/>
+          <p:cNvPr id="96" name="CustomShape 2"/>
           <p:cNvSpPr/>
           <p:nvPr/>
         </p:nvSpPr>
         <p:spPr>
           <a:xfrm>
             <a:off x="180720" y="182880"/>
-            <a:ext cx="11797200" cy="446400"/>
+            <a:ext cx="11797560" cy="446760"/>
           </a:xfrm>
           <a:prstGeom prst="rect">
             <a:avLst/>
@@ -6976,7 +7569,7 @@
               </a:lnSpc>
             </a:pPr>
             <a:r>
-              <a:rPr b="1" lang="pt-PT" sz="2400" spc="-1" strike="noStrike">
+              <a:rPr b="1" lang="en-US" sz="2400" spc="-1" strike="noStrike">
                 <a:solidFill>
                   <a:srgbClr val="000000"/>
                 </a:solidFill>
@@ -7006,7 +7599,7 @@
               </a:lnSpc>
             </a:pPr>
             <a:r>
-              <a:rPr b="1" lang="pt-PT" sz="1800" spc="-1" strike="noStrike">
+              <a:rPr b="1" lang="en-US" sz="1800" spc="-1" strike="noStrike">
                 <a:solidFill>
                   <a:srgbClr val="000000"/>
                 </a:solidFill>
@@ -7020,7 +7613,7 @@
             </a:endParaRPr>
           </a:p>
           <a:p>
-            <a:pPr marL="216000" indent="-215640">
+            <a:pPr marL="216000" indent="-216000">
               <a:lnSpc>
                 <a:spcPct val="100000"/>
               </a:lnSpc>
@@ -7032,7 +7625,7 @@
               <a:buChar char=""/>
             </a:pPr>
             <a:r>
-              <a:rPr b="0" lang="pt-PT" sz="1600" spc="-1" strike="noStrike">
+              <a:rPr b="0" lang="en-US" sz="1600" spc="-1" strike="noStrike">
                 <a:solidFill>
                   <a:srgbClr val="000000"/>
                 </a:solidFill>
@@ -7046,7 +7639,7 @@
             </a:endParaRPr>
           </a:p>
           <a:p>
-            <a:pPr marL="216000" indent="-215640">
+            <a:pPr marL="216000" indent="-216000">
               <a:lnSpc>
                 <a:spcPct val="100000"/>
               </a:lnSpc>
@@ -7058,7 +7651,7 @@
               <a:buChar char=""/>
             </a:pPr>
             <a:r>
-              <a:rPr b="0" lang="pt-PT" sz="1600" spc="-1" strike="noStrike">
+              <a:rPr b="0" lang="en-US" sz="1600" spc="-1" strike="noStrike">
                 <a:solidFill>
                   <a:srgbClr val="000000"/>
                 </a:solidFill>
@@ -7072,7 +7665,7 @@
             </a:endParaRPr>
           </a:p>
           <a:p>
-            <a:pPr marL="216000" indent="-215640">
+            <a:pPr marL="216000" indent="-216000">
               <a:lnSpc>
                 <a:spcPct val="100000"/>
               </a:lnSpc>
@@ -7084,7 +7677,7 @@
               <a:buChar char=""/>
             </a:pPr>
             <a:r>
-              <a:rPr b="0" lang="pt-PT" sz="1600" spc="-1" strike="noStrike">
+              <a:rPr b="0" lang="en-US" sz="1600" spc="-1" strike="noStrike">
                 <a:solidFill>
                   <a:srgbClr val="000000"/>
                 </a:solidFill>
@@ -7098,7 +7691,7 @@
             </a:endParaRPr>
           </a:p>
           <a:p>
-            <a:pPr marL="216000" indent="-215640">
+            <a:pPr marL="216000" indent="-216000">
               <a:lnSpc>
                 <a:spcPct val="100000"/>
               </a:lnSpc>
@@ -7110,7 +7703,7 @@
               <a:buChar char=""/>
             </a:pPr>
             <a:r>
-              <a:rPr b="0" lang="pt-PT" sz="1600" spc="-1" strike="noStrike">
+              <a:rPr b="0" lang="en-US" sz="1600" spc="-1" strike="noStrike">
                 <a:solidFill>
                   <a:srgbClr val="000000"/>
                 </a:solidFill>
@@ -7124,7 +7717,7 @@
             </a:endParaRPr>
           </a:p>
           <a:p>
-            <a:pPr marL="216000" indent="-215640">
+            <a:pPr marL="216000" indent="-216000">
               <a:lnSpc>
                 <a:spcPct val="100000"/>
               </a:lnSpc>
@@ -7136,7 +7729,7 @@
               <a:buChar char=""/>
             </a:pPr>
             <a:r>
-              <a:rPr b="0" lang="pt-PT" sz="1600" spc="-1" strike="noStrike">
+              <a:rPr b="0" lang="en-US" sz="1600" spc="-1" strike="noStrike">
                 <a:solidFill>
                   <a:srgbClr val="000000"/>
                 </a:solidFill>
@@ -7150,7 +7743,7 @@
             </a:endParaRPr>
           </a:p>
           <a:p>
-            <a:pPr marL="216000" indent="-215640">
+            <a:pPr marL="216000" indent="-216000">
               <a:lnSpc>
                 <a:spcPct val="100000"/>
               </a:lnSpc>
@@ -7162,7 +7755,7 @@
               <a:buChar char=""/>
             </a:pPr>
             <a:r>
-              <a:rPr b="0" lang="pt-PT" sz="1600" spc="-1" strike="noStrike">
+              <a:rPr b="0" lang="en-US" sz="1600" spc="-1" strike="noStrike">
                 <a:solidFill>
                   <a:srgbClr val="000000"/>
                 </a:solidFill>
@@ -7176,7 +7769,7 @@
             </a:endParaRPr>
           </a:p>
           <a:p>
-            <a:pPr marL="216000" indent="-215640">
+            <a:pPr marL="216000" indent="-216000">
               <a:lnSpc>
                 <a:spcPct val="100000"/>
               </a:lnSpc>
@@ -7188,7 +7781,7 @@
               <a:buChar char=""/>
             </a:pPr>
             <a:r>
-              <a:rPr b="0" lang="pt-PT" sz="1600" spc="-1" strike="noStrike">
+              <a:rPr b="0" lang="en-US" sz="1600" spc="-1" strike="noStrike">
                 <a:solidFill>
                   <a:srgbClr val="000000"/>
                 </a:solidFill>
@@ -7215,7 +7808,7 @@
       </p:sp>
       <p:pic>
         <p:nvPicPr>
-          <p:cNvPr id="92" name="" descr=""/>
+          <p:cNvPr id="97" name="" descr=""/>
           <p:cNvPicPr/>
           <p:nvPr/>
         </p:nvPicPr>
@@ -7226,7 +7819,7 @@
         <p:spPr>
           <a:xfrm>
             <a:off x="11245680" y="100080"/>
-            <a:ext cx="814320" cy="1123920"/>
+            <a:ext cx="814680" cy="1124280"/>
           </a:xfrm>
           <a:prstGeom prst="rect">
             <a:avLst/>
@@ -7297,14 +7890,14 @@
       </p:grpSpPr>
       <p:sp>
         <p:nvSpPr>
-          <p:cNvPr id="93" name="CustomShape 1"/>
+          <p:cNvPr id="98" name="CustomShape 1"/>
           <p:cNvSpPr/>
           <p:nvPr/>
         </p:nvSpPr>
         <p:spPr>
           <a:xfrm>
             <a:off x="182880" y="183240"/>
-            <a:ext cx="11703600" cy="6125760"/>
+            <a:ext cx="11703960" cy="6126120"/>
           </a:xfrm>
           <a:prstGeom prst="rect">
             <a:avLst/>
@@ -7329,7 +7922,7 @@
               </a:lnSpc>
             </a:pPr>
             <a:r>
-              <a:rPr b="1" lang="pt-PT" sz="2400" spc="-1" strike="noStrike">
+              <a:rPr b="1" lang="en-US" sz="2400" spc="-1" strike="noStrike">
                 <a:solidFill>
                   <a:srgbClr val="000000"/>
                 </a:solidFill>
@@ -7359,7 +7952,7 @@
               </a:lnSpc>
             </a:pPr>
             <a:r>
-              <a:rPr b="1" lang="pt-PT" sz="1800" spc="-1" strike="noStrike">
+              <a:rPr b="1" lang="en-US" sz="1800" spc="-1" strike="noStrike">
                 <a:solidFill>
                   <a:srgbClr val="000000"/>
                 </a:solidFill>
@@ -7373,7 +7966,7 @@
             </a:endParaRPr>
           </a:p>
           <a:p>
-            <a:pPr marL="216000" indent="-215640">
+            <a:pPr marL="216000" indent="-216000">
               <a:lnSpc>
                 <a:spcPct val="100000"/>
               </a:lnSpc>
@@ -7385,7 +7978,7 @@
               <a:buChar char=""/>
             </a:pPr>
             <a:r>
-              <a:rPr b="0" lang="pt-PT" sz="1600" spc="-1" strike="noStrike">
+              <a:rPr b="0" lang="en-US" sz="1600" spc="-1" strike="noStrike">
                 <a:solidFill>
                   <a:srgbClr val="000000"/>
                 </a:solidFill>
@@ -7399,7 +7992,7 @@
             </a:endParaRPr>
           </a:p>
           <a:p>
-            <a:pPr marL="216000" indent="-215640">
+            <a:pPr marL="216000" indent="-216000">
               <a:lnSpc>
                 <a:spcPct val="100000"/>
               </a:lnSpc>
@@ -7411,7 +8004,7 @@
               <a:buChar char=""/>
             </a:pPr>
             <a:r>
-              <a:rPr b="0" lang="pt-PT" sz="1600" spc="-1" strike="noStrike">
+              <a:rPr b="0" lang="en-US" sz="1600" spc="-1" strike="noStrike">
                 <a:solidFill>
                   <a:srgbClr val="000000"/>
                 </a:solidFill>
@@ -7425,7 +8018,7 @@
             </a:endParaRPr>
           </a:p>
           <a:p>
-            <a:pPr marL="216000" indent="-215640">
+            <a:pPr marL="216000" indent="-216000">
               <a:lnSpc>
                 <a:spcPct val="100000"/>
               </a:lnSpc>
@@ -7437,7 +8030,7 @@
               <a:buChar char=""/>
             </a:pPr>
             <a:r>
-              <a:rPr b="0" lang="pt-PT" sz="1600" spc="-1" strike="noStrike">
+              <a:rPr b="0" lang="en-US" sz="1600" spc="-1" strike="noStrike">
                 <a:solidFill>
                   <a:srgbClr val="000000"/>
                 </a:solidFill>
@@ -7467,7 +8060,7 @@
               </a:lnSpc>
             </a:pPr>
             <a:r>
-              <a:rPr b="1" lang="pt-PT" sz="1800" spc="-1" strike="noStrike">
+              <a:rPr b="1" lang="en-US" sz="1800" spc="-1" strike="noStrike">
                 <a:solidFill>
                   <a:srgbClr val="000000"/>
                 </a:solidFill>
@@ -7487,7 +8080,7 @@
               </a:lnSpc>
             </a:pPr>
             <a:r>
-              <a:rPr b="0" lang="pt-PT" sz="1600" spc="-1" strike="noStrike">
+              <a:rPr b="0" lang="en-US" sz="1600" spc="-1" strike="noStrike">
                 <a:solidFill>
                   <a:srgbClr val="000000"/>
                 </a:solidFill>
@@ -7507,7 +8100,7 @@
               </a:lnSpc>
             </a:pPr>
             <a:r>
-              <a:rPr b="0" lang="pt-PT" sz="1600" spc="-1" strike="noStrike">
+              <a:rPr b="0" lang="en-US" sz="1600" spc="-1" strike="noStrike">
                 <a:solidFill>
                   <a:srgbClr val="000000"/>
                 </a:solidFill>
@@ -7527,7 +8120,7 @@
               </a:lnSpc>
             </a:pPr>
             <a:r>
-              <a:rPr b="0" lang="pt-PT" sz="1600" spc="-1" strike="noStrike">
+              <a:rPr b="0" lang="en-US" sz="1600" spc="-1" strike="noStrike">
                 <a:solidFill>
                   <a:srgbClr val="000000"/>
                 </a:solidFill>
@@ -7541,7 +8134,7 @@
             </a:endParaRPr>
           </a:p>
           <a:p>
-            <a:pPr marL="216000" indent="-215640">
+            <a:pPr marL="216000" indent="-216000">
               <a:lnSpc>
                 <a:spcPct val="100000"/>
               </a:lnSpc>
@@ -7553,7 +8146,7 @@
               <a:buChar char=""/>
             </a:pPr>
             <a:r>
-              <a:rPr b="0" lang="pt-PT" sz="1600" spc="-1" strike="noStrike">
+              <a:rPr b="0" lang="en-US" sz="1600" spc="-1" strike="noStrike">
                 <a:solidFill>
                   <a:srgbClr val="000000"/>
                 </a:solidFill>
@@ -7567,7 +8160,7 @@
             </a:endParaRPr>
           </a:p>
           <a:p>
-            <a:pPr marL="216000" indent="-215640">
+            <a:pPr marL="216000" indent="-216000">
               <a:lnSpc>
                 <a:spcPct val="100000"/>
               </a:lnSpc>
@@ -7579,7 +8172,7 @@
               <a:buChar char=""/>
             </a:pPr>
             <a:r>
-              <a:rPr b="0" lang="pt-PT" sz="1600" spc="-1" strike="noStrike">
+              <a:rPr b="0" lang="en-US" sz="1600" spc="-1" strike="noStrike">
                 <a:solidFill>
                   <a:srgbClr val="000000"/>
                 </a:solidFill>
@@ -7593,7 +8186,7 @@
             </a:endParaRPr>
           </a:p>
           <a:p>
-            <a:pPr marL="216000" indent="-215640">
+            <a:pPr marL="216000" indent="-216000">
               <a:lnSpc>
                 <a:spcPct val="100000"/>
               </a:lnSpc>
@@ -7605,7 +8198,7 @@
               <a:buChar char=""/>
             </a:pPr>
             <a:r>
-              <a:rPr b="0" lang="pt-PT" sz="1600" spc="-1" strike="noStrike">
+              <a:rPr b="0" lang="en-US" sz="1600" spc="-1" strike="noStrike">
                 <a:solidFill>
                   <a:srgbClr val="000000"/>
                 </a:solidFill>
@@ -7635,7 +8228,7 @@
               </a:lnSpc>
             </a:pPr>
             <a:r>
-              <a:rPr b="0" lang="pt-PT" sz="1600" spc="-1" strike="noStrike">
+              <a:rPr b="0" lang="en-US" sz="1600" spc="-1" strike="noStrike">
                 <a:solidFill>
                   <a:srgbClr val="000000"/>
                 </a:solidFill>
@@ -7649,7 +8242,7 @@
             </a:endParaRPr>
           </a:p>
           <a:p>
-            <a:pPr marL="216000" indent="-215640">
+            <a:pPr marL="216000" indent="-216000">
               <a:lnSpc>
                 <a:spcPct val="100000"/>
               </a:lnSpc>
@@ -7661,7 +8254,7 @@
               <a:buChar char=""/>
             </a:pPr>
             <a:r>
-              <a:rPr b="0" lang="pt-PT" sz="1600" spc="-1" strike="noStrike">
+              <a:rPr b="0" lang="en-US" sz="1600" spc="-1" strike="noStrike">
                 <a:solidFill>
                   <a:srgbClr val="000000"/>
                 </a:solidFill>
@@ -7675,7 +8268,7 @@
             </a:endParaRPr>
           </a:p>
           <a:p>
-            <a:pPr marL="216000" indent="-215640">
+            <a:pPr marL="216000" indent="-216000">
               <a:lnSpc>
                 <a:spcPct val="100000"/>
               </a:lnSpc>
@@ -7687,7 +8280,7 @@
               <a:buChar char=""/>
             </a:pPr>
             <a:r>
-              <a:rPr b="0" lang="pt-PT" sz="1600" spc="-1" strike="noStrike">
+              <a:rPr b="0" lang="en-US" sz="1600" spc="-1" strike="noStrike">
                 <a:solidFill>
                   <a:srgbClr val="000000"/>
                 </a:solidFill>
@@ -7701,7 +8294,7 @@
             </a:endParaRPr>
           </a:p>
           <a:p>
-            <a:pPr marL="216000" indent="-215640">
+            <a:pPr marL="216000" indent="-216000">
               <a:lnSpc>
                 <a:spcPct val="100000"/>
               </a:lnSpc>
@@ -7713,7 +8306,7 @@
               <a:buChar char=""/>
             </a:pPr>
             <a:r>
-              <a:rPr b="0" lang="pt-PT" sz="1600" spc="-1" strike="noStrike">
+              <a:rPr b="0" lang="en-US" sz="1600" spc="-1" strike="noStrike">
                 <a:solidFill>
                   <a:srgbClr val="000000"/>
                 </a:solidFill>
@@ -7730,7 +8323,7 @@
       </p:sp>
       <p:pic>
         <p:nvPicPr>
-          <p:cNvPr id="94" name="" descr=""/>
+          <p:cNvPr id="99" name="" descr=""/>
           <p:cNvPicPr/>
           <p:nvPr/>
         </p:nvPicPr>
@@ -7741,7 +8334,7 @@
         <p:spPr>
           <a:xfrm>
             <a:off x="11245680" y="100080"/>
-            <a:ext cx="814320" cy="1123920"/>
+            <a:ext cx="814680" cy="1124280"/>
           </a:xfrm>
           <a:prstGeom prst="rect">
             <a:avLst/>
@@ -7812,14 +8405,14 @@
       </p:grpSpPr>
       <p:sp>
         <p:nvSpPr>
-          <p:cNvPr id="95" name="CustomShape 1"/>
+          <p:cNvPr id="100" name="CustomShape 1"/>
           <p:cNvSpPr/>
           <p:nvPr/>
         </p:nvSpPr>
         <p:spPr>
           <a:xfrm>
             <a:off x="182880" y="183240"/>
-            <a:ext cx="11703600" cy="6125760"/>
+            <a:ext cx="11703960" cy="6126120"/>
           </a:xfrm>
           <a:prstGeom prst="rect">
             <a:avLst/>
@@ -7844,7 +8437,7 @@
               </a:lnSpc>
             </a:pPr>
             <a:r>
-              <a:rPr b="1" lang="pt-PT" sz="2400" spc="-1" strike="noStrike">
+              <a:rPr b="1" lang="en-US" sz="2400" spc="-1" strike="noStrike">
                 <a:solidFill>
                   <a:srgbClr val="000000"/>
                 </a:solidFill>
@@ -7874,7 +8467,7 @@
               </a:lnSpc>
             </a:pPr>
             <a:r>
-              <a:rPr b="1" lang="pt-PT" sz="1800" spc="-1" strike="noStrike">
+              <a:rPr b="1" lang="en-US" sz="1800" spc="-1" strike="noStrike">
                 <a:solidFill>
                   <a:srgbClr val="000000"/>
                 </a:solidFill>
@@ -7888,7 +8481,7 @@
             </a:endParaRPr>
           </a:p>
           <a:p>
-            <a:pPr marL="216000" indent="-215640">
+            <a:pPr marL="216000" indent="-216000">
               <a:lnSpc>
                 <a:spcPct val="100000"/>
               </a:lnSpc>
@@ -7900,7 +8493,7 @@
               <a:buChar char=""/>
             </a:pPr>
             <a:r>
-              <a:rPr b="0" lang="pt-PT" sz="1600" spc="-1" strike="noStrike">
+              <a:rPr b="0" lang="en-US" sz="1600" spc="-1" strike="noStrike">
                 <a:solidFill>
                   <a:srgbClr val="000000"/>
                 </a:solidFill>
@@ -7914,7 +8507,7 @@
             </a:endParaRPr>
           </a:p>
           <a:p>
-            <a:pPr marL="216000" indent="-215640">
+            <a:pPr marL="216000" indent="-216000">
               <a:lnSpc>
                 <a:spcPct val="100000"/>
               </a:lnSpc>
@@ -7926,7 +8519,7 @@
               <a:buChar char=""/>
             </a:pPr>
             <a:r>
-              <a:rPr b="0" lang="pt-PT" sz="1600" spc="-1" strike="noStrike">
+              <a:rPr b="0" lang="en-US" sz="1600" spc="-1" strike="noStrike">
                 <a:solidFill>
                   <a:srgbClr val="000000"/>
                 </a:solidFill>
@@ -7940,7 +8533,7 @@
             </a:endParaRPr>
           </a:p>
           <a:p>
-            <a:pPr marL="216000" indent="-215640">
+            <a:pPr marL="216000" indent="-216000">
               <a:lnSpc>
                 <a:spcPct val="100000"/>
               </a:lnSpc>
@@ -7952,7 +8545,7 @@
               <a:buChar char=""/>
             </a:pPr>
             <a:r>
-              <a:rPr b="0" lang="pt-PT" sz="1600" spc="-1" strike="noStrike">
+              <a:rPr b="0" lang="en-US" sz="1600" spc="-1" strike="noStrike">
                 <a:solidFill>
                   <a:srgbClr val="000000"/>
                 </a:solidFill>
@@ -7982,7 +8575,7 @@
               </a:lnSpc>
             </a:pPr>
             <a:r>
-              <a:rPr b="1" lang="pt-PT" sz="1600" spc="-1" strike="noStrike">
+              <a:rPr b="1" lang="en-US" sz="1600" spc="-1" strike="noStrike">
                 <a:solidFill>
                   <a:srgbClr val="000000"/>
                 </a:solidFill>
@@ -7996,7 +8589,7 @@
             </a:endParaRPr>
           </a:p>
           <a:p>
-            <a:pPr marL="216000" indent="-215640">
+            <a:pPr marL="216000" indent="-216000">
               <a:lnSpc>
                 <a:spcPct val="100000"/>
               </a:lnSpc>
@@ -8008,7 +8601,7 @@
               <a:buChar char=""/>
             </a:pPr>
             <a:r>
-              <a:rPr b="0" lang="pt-PT" sz="1600" spc="-1" strike="noStrike">
+              <a:rPr b="0" lang="en-US" sz="1600" spc="-1" strike="noStrike">
                 <a:solidFill>
                   <a:srgbClr val="000000"/>
                 </a:solidFill>
@@ -8022,7 +8615,7 @@
             </a:endParaRPr>
           </a:p>
           <a:p>
-            <a:pPr marL="216000" indent="-215640">
+            <a:pPr marL="216000" indent="-216000">
               <a:lnSpc>
                 <a:spcPct val="100000"/>
               </a:lnSpc>
@@ -8034,7 +8627,7 @@
               <a:buChar char=""/>
             </a:pPr>
             <a:r>
-              <a:rPr b="0" lang="pt-PT" sz="1600" spc="-1" strike="noStrike">
+              <a:rPr b="0" lang="en-US" sz="1600" spc="-1" strike="noStrike">
                 <a:solidFill>
                   <a:srgbClr val="000000"/>
                 </a:solidFill>
@@ -8048,7 +8641,7 @@
             </a:endParaRPr>
           </a:p>
           <a:p>
-            <a:pPr marL="216000" indent="-215640">
+            <a:pPr marL="216000" indent="-216000">
               <a:lnSpc>
                 <a:spcPct val="100000"/>
               </a:lnSpc>
@@ -8060,7 +8653,7 @@
               <a:buChar char=""/>
             </a:pPr>
             <a:r>
-              <a:rPr b="0" lang="pt-PT" sz="1600" spc="-1" strike="noStrike">
+              <a:rPr b="0" lang="en-US" sz="1600" spc="-1" strike="noStrike">
                 <a:solidFill>
                   <a:srgbClr val="000000"/>
                 </a:solidFill>
@@ -8074,37 +8667,7 @@
             </a:endParaRPr>
           </a:p>
           <a:p>
-            <a:pPr>
-              <a:lnSpc>
-                <a:spcPct val="100000"/>
-              </a:lnSpc>
-            </a:pPr>
-            <a:endParaRPr b="0" lang="pt-PT" sz="1600" spc="-1" strike="noStrike">
-              <a:latin typeface="DejaVu Sans"/>
-            </a:endParaRPr>
-          </a:p>
-          <a:p>
-            <a:pPr>
-              <a:lnSpc>
-                <a:spcPct val="100000"/>
-              </a:lnSpc>
-            </a:pPr>
-            <a:r>
-              <a:rPr b="1" lang="pt-PT" sz="1600" spc="-1" strike="noStrike">
-                <a:solidFill>
-                  <a:srgbClr val="000000"/>
-                </a:solidFill>
-                <a:latin typeface="Verdana"/>
-                <a:ea typeface="Verdana"/>
-              </a:rPr>
-              <a:t>Configuration</a:t>
-            </a:r>
-            <a:endParaRPr b="0" lang="pt-PT" sz="1600" spc="-1" strike="noStrike">
-              <a:latin typeface="DejaVu Sans"/>
-            </a:endParaRPr>
-          </a:p>
-          <a:p>
-            <a:pPr marL="216000" indent="-215640">
+            <a:pPr marL="216000" indent="-216000">
               <a:lnSpc>
                 <a:spcPct val="100000"/>
               </a:lnSpc>
@@ -8115,22 +8678,32 @@
               <a:buFont typeface="Wingdings" charset="2"/>
               <a:buChar char=""/>
             </a:pPr>
-            <a:r>
-              <a:rPr b="0" lang="pt-PT" sz="1600" spc="-1" strike="noStrike">
-                <a:solidFill>
-                  <a:srgbClr val="000000"/>
-                </a:solidFill>
-                <a:latin typeface="Verdana"/>
-                <a:ea typeface="Verdana"/>
-              </a:rPr>
-              <a:t>Jenkins Management</a:t>
-            </a:r>
-            <a:endParaRPr b="0" lang="pt-PT" sz="1600" spc="-1" strike="noStrike">
-              <a:latin typeface="DejaVu Sans"/>
-            </a:endParaRPr>
-          </a:p>
-          <a:p>
-            <a:pPr marL="216000" indent="-215640">
+            <a:endParaRPr b="0" lang="pt-PT" sz="1600" spc="-1" strike="noStrike">
+              <a:latin typeface="DejaVu Sans"/>
+            </a:endParaRPr>
+          </a:p>
+          <a:p>
+            <a:pPr>
+              <a:lnSpc>
+                <a:spcPct val="100000"/>
+              </a:lnSpc>
+            </a:pPr>
+            <a:r>
+              <a:rPr b="1" lang="en-US" sz="1600" spc="-1" strike="noStrike">
+                <a:solidFill>
+                  <a:srgbClr val="000000"/>
+                </a:solidFill>
+                <a:latin typeface="Verdana"/>
+                <a:ea typeface="Verdana"/>
+              </a:rPr>
+              <a:t>Configuration</a:t>
+            </a:r>
+            <a:endParaRPr b="0" lang="pt-PT" sz="1600" spc="-1" strike="noStrike">
+              <a:latin typeface="DejaVu Sans"/>
+            </a:endParaRPr>
+          </a:p>
+          <a:p>
+            <a:pPr marL="216000" indent="-216000">
               <a:lnSpc>
                 <a:spcPct val="100000"/>
               </a:lnSpc>
@@ -8142,21 +8715,21 @@
               <a:buChar char=""/>
             </a:pPr>
             <a:r>
-              <a:rPr b="0" lang="pt-PT" sz="1600" spc="-1" strike="noStrike">
-                <a:solidFill>
-                  <a:srgbClr val="000000"/>
-                </a:solidFill>
-                <a:latin typeface="Verdana"/>
-                <a:ea typeface="Verdana"/>
-              </a:rPr>
-              <a:t>Global Tool Configurations</a:t>
-            </a:r>
-            <a:endParaRPr b="0" lang="pt-PT" sz="1600" spc="-1" strike="noStrike">
-              <a:latin typeface="DejaVu Sans"/>
-            </a:endParaRPr>
-          </a:p>
-          <a:p>
-            <a:pPr marL="216000" indent="-215640">
+              <a:rPr b="0" lang="en-US" sz="1600" spc="-1" strike="noStrike">
+                <a:solidFill>
+                  <a:srgbClr val="000000"/>
+                </a:solidFill>
+                <a:latin typeface="Verdana"/>
+                <a:ea typeface="Verdana"/>
+              </a:rPr>
+              <a:t>Jenkins Management</a:t>
+            </a:r>
+            <a:endParaRPr b="0" lang="pt-PT" sz="1600" spc="-1" strike="noStrike">
+              <a:latin typeface="DejaVu Sans"/>
+            </a:endParaRPr>
+          </a:p>
+          <a:p>
+            <a:pPr marL="216000" indent="-216000">
               <a:lnSpc>
                 <a:spcPct val="100000"/>
               </a:lnSpc>
@@ -8168,21 +8741,21 @@
               <a:buChar char=""/>
             </a:pPr>
             <a:r>
-              <a:rPr b="0" lang="pt-PT" sz="1600" spc="-1" strike="noStrike">
-                <a:solidFill>
-                  <a:srgbClr val="000000"/>
-                </a:solidFill>
-                <a:latin typeface="Verdana"/>
-                <a:ea typeface="Verdana"/>
-              </a:rPr>
-              <a:t>Credentials</a:t>
-            </a:r>
-            <a:endParaRPr b="0" lang="pt-PT" sz="1600" spc="-1" strike="noStrike">
-              <a:latin typeface="DejaVu Sans"/>
-            </a:endParaRPr>
-          </a:p>
-          <a:p>
-            <a:pPr marL="216000" indent="-215640">
+              <a:rPr b="0" lang="en-US" sz="1600" spc="-1" strike="noStrike">
+                <a:solidFill>
+                  <a:srgbClr val="000000"/>
+                </a:solidFill>
+                <a:latin typeface="Verdana"/>
+                <a:ea typeface="Verdana"/>
+              </a:rPr>
+              <a:t>Global Tool Configurations</a:t>
+            </a:r>
+            <a:endParaRPr b="0" lang="pt-PT" sz="1600" spc="-1" strike="noStrike">
+              <a:latin typeface="DejaVu Sans"/>
+            </a:endParaRPr>
+          </a:p>
+          <a:p>
+            <a:pPr marL="216000" indent="-216000">
               <a:lnSpc>
                 <a:spcPct val="100000"/>
               </a:lnSpc>
@@ -8194,21 +8767,21 @@
               <a:buChar char=""/>
             </a:pPr>
             <a:r>
-              <a:rPr b="0" lang="pt-PT" sz="1600" spc="-1" strike="noStrike">
-                <a:solidFill>
-                  <a:srgbClr val="000000"/>
-                </a:solidFill>
-                <a:latin typeface="Verdana"/>
-                <a:ea typeface="Verdana"/>
-              </a:rPr>
-              <a:t>Nodes</a:t>
-            </a:r>
-            <a:endParaRPr b="0" lang="pt-PT" sz="1600" spc="-1" strike="noStrike">
-              <a:latin typeface="DejaVu Sans"/>
-            </a:endParaRPr>
-          </a:p>
-          <a:p>
-            <a:pPr marL="216000" indent="-215640">
+              <a:rPr b="0" lang="en-US" sz="1600" spc="-1" strike="noStrike">
+                <a:solidFill>
+                  <a:srgbClr val="000000"/>
+                </a:solidFill>
+                <a:latin typeface="Verdana"/>
+                <a:ea typeface="Verdana"/>
+              </a:rPr>
+              <a:t>Credentials</a:t>
+            </a:r>
+            <a:endParaRPr b="0" lang="pt-PT" sz="1600" spc="-1" strike="noStrike">
+              <a:latin typeface="DejaVu Sans"/>
+            </a:endParaRPr>
+          </a:p>
+          <a:p>
+            <a:pPr marL="216000" indent="-216000">
               <a:lnSpc>
                 <a:spcPct val="100000"/>
               </a:lnSpc>
@@ -8220,21 +8793,21 @@
               <a:buChar char=""/>
             </a:pPr>
             <a:r>
-              <a:rPr b="0" lang="pt-PT" sz="1600" spc="-1" strike="noStrike">
-                <a:solidFill>
-                  <a:srgbClr val="000000"/>
-                </a:solidFill>
-                <a:latin typeface="Verdana"/>
-                <a:ea typeface="Verdana"/>
-              </a:rPr>
-              <a:t>Reload Configuration from Disk</a:t>
-            </a:r>
-            <a:endParaRPr b="0" lang="pt-PT" sz="1600" spc="-1" strike="noStrike">
-              <a:latin typeface="DejaVu Sans"/>
-            </a:endParaRPr>
-          </a:p>
-          <a:p>
-            <a:pPr marL="216000" indent="-215640">
+              <a:rPr b="0" lang="en-US" sz="1600" spc="-1" strike="noStrike">
+                <a:solidFill>
+                  <a:srgbClr val="000000"/>
+                </a:solidFill>
+                <a:latin typeface="Verdana"/>
+                <a:ea typeface="Verdana"/>
+              </a:rPr>
+              <a:t>Nodes</a:t>
+            </a:r>
+            <a:endParaRPr b="0" lang="pt-PT" sz="1600" spc="-1" strike="noStrike">
+              <a:latin typeface="DejaVu Sans"/>
+            </a:endParaRPr>
+          </a:p>
+          <a:p>
+            <a:pPr marL="216000" indent="-216000">
               <a:lnSpc>
                 <a:spcPct val="100000"/>
               </a:lnSpc>
@@ -8246,51 +8819,21 @@
               <a:buChar char=""/>
             </a:pPr>
             <a:r>
-              <a:rPr b="0" lang="pt-PT" sz="1600" spc="-1" strike="noStrike">
-                <a:solidFill>
-                  <a:srgbClr val="000000"/>
-                </a:solidFill>
-                <a:latin typeface="Verdana"/>
-                <a:ea typeface="Verdana"/>
-              </a:rPr>
-              <a:t>Manage Plugins</a:t>
-            </a:r>
-            <a:endParaRPr b="0" lang="pt-PT" sz="1600" spc="-1" strike="noStrike">
-              <a:latin typeface="DejaVu Sans"/>
-            </a:endParaRPr>
-          </a:p>
-          <a:p>
-            <a:pPr>
-              <a:lnSpc>
-                <a:spcPct val="100000"/>
-              </a:lnSpc>
-            </a:pPr>
-            <a:endParaRPr b="0" lang="pt-PT" sz="1600" spc="-1" strike="noStrike">
-              <a:latin typeface="DejaVu Sans"/>
-            </a:endParaRPr>
-          </a:p>
-          <a:p>
-            <a:pPr>
-              <a:lnSpc>
-                <a:spcPct val="100000"/>
-              </a:lnSpc>
-            </a:pPr>
-            <a:r>
-              <a:rPr b="1" lang="pt-PT" sz="1600" spc="-1" strike="noStrike">
-                <a:solidFill>
-                  <a:srgbClr val="000000"/>
-                </a:solidFill>
-                <a:latin typeface="Verdana"/>
-                <a:ea typeface="Verdana"/>
-              </a:rPr>
-              <a:t>Security / Access Control</a:t>
-            </a:r>
-            <a:endParaRPr b="0" lang="pt-PT" sz="1600" spc="-1" strike="noStrike">
-              <a:latin typeface="DejaVu Sans"/>
-            </a:endParaRPr>
-          </a:p>
-          <a:p>
-            <a:pPr marL="216000" indent="-215640">
+              <a:rPr b="0" lang="en-US" sz="1600" spc="-1" strike="noStrike">
+                <a:solidFill>
+                  <a:srgbClr val="000000"/>
+                </a:solidFill>
+                <a:latin typeface="Verdana"/>
+                <a:ea typeface="Verdana"/>
+              </a:rPr>
+              <a:t>Reload Configuration from Disk</a:t>
+            </a:r>
+            <a:endParaRPr b="0" lang="pt-PT" sz="1600" spc="-1" strike="noStrike">
+              <a:latin typeface="DejaVu Sans"/>
+            </a:endParaRPr>
+          </a:p>
+          <a:p>
+            <a:pPr marL="216000" indent="-216000">
               <a:lnSpc>
                 <a:spcPct val="100000"/>
               </a:lnSpc>
@@ -8302,21 +8845,51 @@
               <a:buChar char=""/>
             </a:pPr>
             <a:r>
-              <a:rPr b="0" lang="pt-PT" sz="1600" spc="-1" strike="noStrike">
-                <a:solidFill>
-                  <a:srgbClr val="000000"/>
-                </a:solidFill>
-                <a:latin typeface="Verdana"/>
-                <a:ea typeface="Verdana"/>
-              </a:rPr>
-              <a:t>JNLP</a:t>
-            </a:r>
-            <a:endParaRPr b="0" lang="pt-PT" sz="1600" spc="-1" strike="noStrike">
-              <a:latin typeface="DejaVu Sans"/>
-            </a:endParaRPr>
-          </a:p>
-          <a:p>
-            <a:pPr marL="216000" indent="-215640">
+              <a:rPr b="0" lang="en-US" sz="1600" spc="-1" strike="noStrike">
+                <a:solidFill>
+                  <a:srgbClr val="000000"/>
+                </a:solidFill>
+                <a:latin typeface="Verdana"/>
+                <a:ea typeface="Verdana"/>
+              </a:rPr>
+              <a:t>Manage Plugins</a:t>
+            </a:r>
+            <a:endParaRPr b="0" lang="pt-PT" sz="1600" spc="-1" strike="noStrike">
+              <a:latin typeface="DejaVu Sans"/>
+            </a:endParaRPr>
+          </a:p>
+          <a:p>
+            <a:pPr>
+              <a:lnSpc>
+                <a:spcPct val="100000"/>
+              </a:lnSpc>
+            </a:pPr>
+            <a:endParaRPr b="0" lang="pt-PT" sz="1600" spc="-1" strike="noStrike">
+              <a:latin typeface="DejaVu Sans"/>
+            </a:endParaRPr>
+          </a:p>
+          <a:p>
+            <a:pPr>
+              <a:lnSpc>
+                <a:spcPct val="100000"/>
+              </a:lnSpc>
+            </a:pPr>
+            <a:r>
+              <a:rPr b="1" lang="en-US" sz="1600" spc="-1" strike="noStrike">
+                <a:solidFill>
+                  <a:srgbClr val="000000"/>
+                </a:solidFill>
+                <a:latin typeface="Verdana"/>
+                <a:ea typeface="Verdana"/>
+              </a:rPr>
+              <a:t>Security / Access Control</a:t>
+            </a:r>
+            <a:endParaRPr b="0" lang="pt-PT" sz="1600" spc="-1" strike="noStrike">
+              <a:latin typeface="DejaVu Sans"/>
+            </a:endParaRPr>
+          </a:p>
+          <a:p>
+            <a:pPr marL="216000" indent="-216000">
               <a:lnSpc>
                 <a:spcPct val="100000"/>
               </a:lnSpc>
@@ -8328,21 +8901,21 @@
               <a:buChar char=""/>
             </a:pPr>
             <a:r>
-              <a:rPr b="0" lang="pt-PT" sz="1600" spc="-1" strike="noStrike">
-                <a:solidFill>
-                  <a:srgbClr val="000000"/>
-                </a:solidFill>
-                <a:latin typeface="Verdana"/>
-                <a:ea typeface="Verdana"/>
-              </a:rPr>
-              <a:t>Security Realm</a:t>
-            </a:r>
-            <a:endParaRPr b="0" lang="pt-PT" sz="1600" spc="-1" strike="noStrike">
-              <a:latin typeface="DejaVu Sans"/>
-            </a:endParaRPr>
-          </a:p>
-          <a:p>
-            <a:pPr marL="216000" indent="-215640">
+              <a:rPr b="0" lang="en-US" sz="1600" spc="-1" strike="noStrike">
+                <a:solidFill>
+                  <a:srgbClr val="000000"/>
+                </a:solidFill>
+                <a:latin typeface="Verdana"/>
+                <a:ea typeface="Verdana"/>
+              </a:rPr>
+              <a:t>JNLP</a:t>
+            </a:r>
+            <a:endParaRPr b="0" lang="pt-PT" sz="1600" spc="-1" strike="noStrike">
+              <a:latin typeface="DejaVu Sans"/>
+            </a:endParaRPr>
+          </a:p>
+          <a:p>
+            <a:pPr marL="216000" indent="-216000">
               <a:lnSpc>
                 <a:spcPct val="100000"/>
               </a:lnSpc>
@@ -8354,21 +8927,21 @@
               <a:buChar char=""/>
             </a:pPr>
             <a:r>
-              <a:rPr b="0" lang="pt-PT" sz="1600" spc="-1" strike="noStrike">
-                <a:solidFill>
-                  <a:srgbClr val="000000"/>
-                </a:solidFill>
-                <a:latin typeface="Verdana"/>
-                <a:ea typeface="Verdana"/>
-              </a:rPr>
-              <a:t>Authorization</a:t>
-            </a:r>
-            <a:endParaRPr b="0" lang="pt-PT" sz="1600" spc="-1" strike="noStrike">
-              <a:latin typeface="DejaVu Sans"/>
-            </a:endParaRPr>
-          </a:p>
-          <a:p>
-            <a:pPr marL="216000" indent="-215640">
+              <a:rPr b="0" lang="en-US" sz="1600" spc="-1" strike="noStrike">
+                <a:solidFill>
+                  <a:srgbClr val="000000"/>
+                </a:solidFill>
+                <a:latin typeface="Verdana"/>
+                <a:ea typeface="Verdana"/>
+              </a:rPr>
+              <a:t>Security Realm</a:t>
+            </a:r>
+            <a:endParaRPr b="0" lang="pt-PT" sz="1600" spc="-1" strike="noStrike">
+              <a:latin typeface="DejaVu Sans"/>
+            </a:endParaRPr>
+          </a:p>
+          <a:p>
+            <a:pPr marL="216000" indent="-216000">
               <a:lnSpc>
                 <a:spcPct val="100000"/>
               </a:lnSpc>
@@ -8380,7 +8953,33 @@
               <a:buChar char=""/>
             </a:pPr>
             <a:r>
-              <a:rPr b="0" lang="pt-PT" sz="1600" spc="-1" strike="noStrike">
+              <a:rPr b="0" lang="en-US" sz="1600" spc="-1" strike="noStrike">
+                <a:solidFill>
+                  <a:srgbClr val="000000"/>
+                </a:solidFill>
+                <a:latin typeface="Verdana"/>
+                <a:ea typeface="Verdana"/>
+              </a:rPr>
+              <a:t>Authorization</a:t>
+            </a:r>
+            <a:endParaRPr b="0" lang="pt-PT" sz="1600" spc="-1" strike="noStrike">
+              <a:latin typeface="DejaVu Sans"/>
+            </a:endParaRPr>
+          </a:p>
+          <a:p>
+            <a:pPr marL="216000" indent="-216000">
+              <a:lnSpc>
+                <a:spcPct val="100000"/>
+              </a:lnSpc>
+              <a:buClr>
+                <a:srgbClr val="000000"/>
+              </a:buClr>
+              <a:buSzPct val="45000"/>
+              <a:buFont typeface="Wingdings" charset="2"/>
+              <a:buChar char=""/>
+            </a:pPr>
+            <a:r>
+              <a:rPr b="0" lang="en-US" sz="1600" spc="-1" strike="noStrike">
                 <a:solidFill>
                   <a:srgbClr val="000000"/>
                 </a:solidFill>
@@ -8397,7 +8996,7 @@
       </p:sp>
       <p:pic>
         <p:nvPicPr>
-          <p:cNvPr id="96" name="" descr=""/>
+          <p:cNvPr id="101" name="" descr=""/>
           <p:cNvPicPr/>
           <p:nvPr/>
         </p:nvPicPr>
@@ -8408,7 +9007,7 @@
         <p:spPr>
           <a:xfrm>
             <a:off x="11245680" y="100080"/>
-            <a:ext cx="814320" cy="1123920"/>
+            <a:ext cx="814680" cy="1124280"/>
           </a:xfrm>
           <a:prstGeom prst="rect">
             <a:avLst/>
@@ -8894,4 +9493,227 @@
     </a:fmtScheme>
   </a:themeElements>
 </a:theme>
+</file>
+
+<file path=ppt/theme/theme3.xml><?xml version="1.0" encoding="utf-8"?>
+<a:theme xmlns:a="http://schemas.openxmlformats.org/drawingml/2006/main" name="Office Theme">
+  <a:themeElements>
+    <a:clrScheme name="Office">
+      <a:dk1>
+        <a:sysClr val="windowText" lastClr="000000"/>
+      </a:dk1>
+      <a:lt1>
+        <a:sysClr val="window" lastClr="FFFFFF"/>
+      </a:lt1>
+      <a:dk2>
+        <a:srgbClr val="1F497D"/>
+      </a:dk2>
+      <a:lt2>
+        <a:srgbClr val="EEECE1"/>
+      </a:lt2>
+      <a:accent1>
+        <a:srgbClr val="4F81BD"/>
+      </a:accent1>
+      <a:accent2>
+        <a:srgbClr val="C0504D"/>
+      </a:accent2>
+      <a:accent3>
+        <a:srgbClr val="9BBB59"/>
+      </a:accent3>
+      <a:accent4>
+        <a:srgbClr val="8064A2"/>
+      </a:accent4>
+      <a:accent5>
+        <a:srgbClr val="4BACC6"/>
+      </a:accent5>
+      <a:accent6>
+        <a:srgbClr val="F79646"/>
+      </a:accent6>
+      <a:hlink>
+        <a:srgbClr val="0000FF"/>
+      </a:hlink>
+      <a:folHlink>
+        <a:srgbClr val="800080"/>
+      </a:folHlink>
+    </a:clrScheme>
+    <a:fontScheme name="Office">
+      <a:majorFont>
+        <a:latin typeface="Arial"/>
+        <a:ea typeface="DejaVu Sans"/>
+        <a:cs typeface="DejaVu Sans"/>
+      </a:majorFont>
+      <a:minorFont>
+        <a:latin typeface="Arial"/>
+        <a:ea typeface="DejaVu Sans"/>
+        <a:cs typeface="DejaVu Sans"/>
+      </a:minorFont>
+    </a:fontScheme>
+    <a:fmtScheme name="Office">
+      <a:fillStyleLst>
+        <a:solidFill>
+          <a:schemeClr val="phClr"/>
+        </a:solidFill>
+        <a:gradFill rotWithShape="1">
+          <a:gsLst>
+            <a:gs pos="0">
+              <a:schemeClr val="phClr">
+                <a:tint val="50000"/>
+                <a:satMod val="300000"/>
+              </a:schemeClr>
+            </a:gs>
+            <a:gs pos="35000">
+              <a:schemeClr val="phClr">
+                <a:tint val="37000"/>
+                <a:satMod val="300000"/>
+              </a:schemeClr>
+            </a:gs>
+            <a:gs pos="100000">
+              <a:schemeClr val="phClr">
+                <a:tint val="15000"/>
+                <a:satMod val="350000"/>
+              </a:schemeClr>
+            </a:gs>
+          </a:gsLst>
+          <a:lin ang="16200000" scaled="1"/>
+        </a:gradFill>
+        <a:gradFill rotWithShape="1">
+          <a:gsLst>
+            <a:gs pos="0">
+              <a:schemeClr val="phClr">
+                <a:shade val="51000"/>
+                <a:satMod val="130000"/>
+              </a:schemeClr>
+            </a:gs>
+            <a:gs pos="80000">
+              <a:schemeClr val="phClr">
+                <a:shade val="93000"/>
+                <a:satMod val="130000"/>
+              </a:schemeClr>
+            </a:gs>
+            <a:gs pos="100000">
+              <a:schemeClr val="phClr">
+                <a:shade val="94000"/>
+                <a:satMod val="135000"/>
+              </a:schemeClr>
+            </a:gs>
+          </a:gsLst>
+          <a:lin ang="16200000" scaled="0"/>
+        </a:gradFill>
+      </a:fillStyleLst>
+      <a:lnStyleLst>
+        <a:ln w="9525" cap="flat" cmpd="sng" algn="ctr">
+          <a:solidFill>
+            <a:schemeClr val="phClr">
+              <a:shade val="95000"/>
+              <a:satMod val="105000"/>
+            </a:schemeClr>
+          </a:solidFill>
+          <a:prstDash val="solid"/>
+        </a:ln>
+        <a:ln w="25400" cap="flat" cmpd="sng" algn="ctr">
+          <a:solidFill>
+            <a:schemeClr val="phClr"/>
+          </a:solidFill>
+          <a:prstDash val="solid"/>
+        </a:ln>
+        <a:ln w="38100" cap="flat" cmpd="sng" algn="ctr">
+          <a:solidFill>
+            <a:schemeClr val="phClr"/>
+          </a:solidFill>
+          <a:prstDash val="solid"/>
+        </a:ln>
+      </a:lnStyleLst>
+      <a:effectStyleLst>
+        <a:effectStyle>
+          <a:effectLst>
+            <a:outerShdw blurRad="40000" dist="20000" dir="5400000" rotWithShape="0">
+              <a:srgbClr val="000000">
+                <a:alpha val="38000"/>
+              </a:srgbClr>
+            </a:outerShdw>
+          </a:effectLst>
+        </a:effectStyle>
+        <a:effectStyle>
+          <a:effectLst>
+            <a:outerShdw blurRad="40000" dist="23000" dir="5400000" rotWithShape="0">
+              <a:srgbClr val="000000">
+                <a:alpha val="35000"/>
+              </a:srgbClr>
+            </a:outerShdw>
+          </a:effectLst>
+        </a:effectStyle>
+        <a:effectStyle>
+          <a:effectLst>
+            <a:outerShdw blurRad="40000" dist="23000" dir="5400000" rotWithShape="0">
+              <a:srgbClr val="000000">
+                <a:alpha val="35000"/>
+              </a:srgbClr>
+            </a:outerShdw>
+          </a:effectLst>
+          <a:scene3d>
+            <a:camera prst="orthographicFront">
+              <a:rot lat="0" lon="0" rev="0"/>
+            </a:camera>
+            <a:lightRig rig="threePt" dir="t">
+              <a:rot lat="0" lon="0" rev="1200000"/>
+            </a:lightRig>
+          </a:scene3d>
+          <a:sp3d>
+            <a:bevelT w="63500" h="25400"/>
+          </a:sp3d>
+        </a:effectStyle>
+      </a:effectStyleLst>
+      <a:bgFillStyleLst>
+        <a:solidFill>
+          <a:schemeClr val="phClr"/>
+        </a:solidFill>
+        <a:gradFill rotWithShape="1">
+          <a:gsLst>
+            <a:gs pos="0">
+              <a:schemeClr val="phClr">
+                <a:tint val="40000"/>
+                <a:satMod val="350000"/>
+              </a:schemeClr>
+            </a:gs>
+            <a:gs pos="40000">
+              <a:schemeClr val="phClr">
+                <a:tint val="45000"/>
+                <a:shade val="99000"/>
+                <a:satMod val="350000"/>
+              </a:schemeClr>
+            </a:gs>
+            <a:gs pos="100000">
+              <a:schemeClr val="phClr">
+                <a:shade val="20000"/>
+                <a:satMod val="255000"/>
+              </a:schemeClr>
+            </a:gs>
+          </a:gsLst>
+          <a:path path="circle">
+            <a:fillToRect l="50000" t="-80000" r="50000" b="180000"/>
+          </a:path>
+        </a:gradFill>
+        <a:gradFill rotWithShape="1">
+          <a:gsLst>
+            <a:gs pos="0">
+              <a:schemeClr val="phClr">
+                <a:tint val="80000"/>
+                <a:satMod val="300000"/>
+              </a:schemeClr>
+            </a:gs>
+            <a:gs pos="100000">
+              <a:schemeClr val="phClr">
+                <a:shade val="30000"/>
+                <a:satMod val="200000"/>
+              </a:schemeClr>
+            </a:gs>
+          </a:gsLst>
+          <a:path path="circle">
+            <a:fillToRect l="50000" t="50000" r="50000" b="50000"/>
+          </a:path>
+        </a:gradFill>
+      </a:bgFillStyleLst>
+    </a:fmtScheme>
+  </a:themeElements>
+</a:theme>
 </file>
</xml_diff>